<commit_message>
chg: Added references and VIS TTP 0.1
</commit_message>
<xml_diff>
--- a/UNDER DEVELOPMENT/OPAR Version 2/VID/INTREP VID OPAR-003 - Syrian ground combat tactics.pptx
+++ b/UNDER DEVELOPMENT/OPAR Version 2/VID/INTREP VID OPAR-003 - Syrian ground combat tactics.pptx
@@ -5,7 +5,7 @@
     <p:sldMasterId id="2147483648" r:id="rId1"/>
   </p:sldMasterIdLst>
   <p:notesMasterIdLst>
-    <p:notesMasterId r:id="rId13"/>
+    <p:notesMasterId r:id="rId17"/>
   </p:notesMasterIdLst>
   <p:sldIdLst>
     <p:sldId id="257" r:id="rId2"/>
@@ -19,6 +19,10 @@
     <p:sldId id="368" r:id="rId10"/>
     <p:sldId id="367" r:id="rId11"/>
     <p:sldId id="365" r:id="rId12"/>
+    <p:sldId id="374" r:id="rId13"/>
+    <p:sldId id="375" r:id="rId14"/>
+    <p:sldId id="376" r:id="rId15"/>
+    <p:sldId id="377" r:id="rId16"/>
   </p:sldIdLst>
   <p:sldSz cx="9144000" cy="5143500" type="screen16x9"/>
   <p:notesSz cx="6858000" cy="9144000"/>
@@ -117,6 +121,22 @@
       </a:defRPr>
     </a:lvl9pPr>
   </p:defaultTextStyle>
+  <p:extLst>
+    <p:ext uri="{EFAFB233-063F-42B5-8137-9DF3F51BA10A}">
+      <p15:sldGuideLst xmlns:p15="http://schemas.microsoft.com/office/powerpoint/2012/main">
+        <p15:guide id="1" orient="horz" pos="1620">
+          <p15:clr>
+            <a:srgbClr val="A4A3A4"/>
+          </p15:clr>
+        </p15:guide>
+        <p15:guide id="2" pos="2880">
+          <p15:clr>
+            <a:srgbClr val="A4A3A4"/>
+          </p15:clr>
+        </p15:guide>
+      </p15:sldGuideLst>
+    </p:ext>
+  </p:extLst>
 </p:presentation>
 </file>
 
@@ -203,7 +223,7 @@
             <a:fld id="{40637A30-8EE1-4060-9976-8832FC89EE34}" type="datetimeFigureOut">
               <a:rPr lang="nb-NO" smtClean="0"/>
               <a:pPr/>
-              <a:t>18.11.2021</a:t>
+              <a:t>05.01.2022</a:t>
             </a:fld>
             <a:endParaRPr lang="nb-NO"/>
           </a:p>
@@ -269,38 +289,37 @@
           <a:p>
             <a:pPr lvl="0"/>
             <a:r>
-              <a:rPr lang="nb-NO" smtClean="0"/>
+              <a:rPr lang="nb-NO"/>
               <a:t>Klikk for å redigere tekststiler i malen</a:t>
             </a:r>
           </a:p>
           <a:p>
             <a:pPr lvl="1"/>
             <a:r>
-              <a:rPr lang="nb-NO" smtClean="0"/>
+              <a:rPr lang="nb-NO"/>
               <a:t>Andre nivå</a:t>
             </a:r>
           </a:p>
           <a:p>
             <a:pPr lvl="2"/>
             <a:r>
-              <a:rPr lang="nb-NO" smtClean="0"/>
+              <a:rPr lang="nb-NO"/>
               <a:t>Tredje nivå</a:t>
             </a:r>
           </a:p>
           <a:p>
             <a:pPr lvl="3"/>
             <a:r>
-              <a:rPr lang="nb-NO" smtClean="0"/>
+              <a:rPr lang="nb-NO"/>
               <a:t>Fjerde nivå</a:t>
             </a:r>
           </a:p>
           <a:p>
             <a:pPr lvl="4"/>
             <a:r>
-              <a:rPr lang="nb-NO" smtClean="0"/>
+              <a:rPr lang="nb-NO"/>
               <a:t>Femte nivå</a:t>
             </a:r>
-            <a:endParaRPr lang="nb-NO"/>
           </a:p>
         </p:txBody>
       </p:sp>
@@ -374,7 +393,7 @@
     </p:spTree>
     <p:extLst>
       <p:ext uri="{BB962C8B-B14F-4D97-AF65-F5344CB8AC3E}">
-        <p14:creationId xmlns:p14="http://schemas.microsoft.com/office/powerpoint/2010/main" xmlns="" val="2256331300"/>
+        <p14:creationId xmlns:p14="http://schemas.microsoft.com/office/powerpoint/2010/main" val="2256331300"/>
       </p:ext>
     </p:extLst>
   </p:cSld>
@@ -599,10 +618,9 @@
           <a:lstStyle/>
           <a:p>
             <a:r>
-              <a:rPr lang="nb-NO" smtClean="0"/>
+              <a:rPr lang="nb-NO"/>
               <a:t>Klikk for å redigere tittelstil</a:t>
             </a:r>
-            <a:endParaRPr lang="nb-NO"/>
           </a:p>
         </p:txBody>
       </p:sp>
@@ -718,10 +736,9 @@
           </a:lstStyle>
           <a:p>
             <a:r>
-              <a:rPr lang="nb-NO" smtClean="0"/>
+              <a:rPr lang="nb-NO"/>
               <a:t>Klikk for å redigere undertittelstil i malen</a:t>
             </a:r>
-            <a:endParaRPr lang="nb-NO"/>
           </a:p>
         </p:txBody>
       </p:sp>
@@ -861,10 +878,9 @@
           </a:lstStyle>
           <a:p>
             <a:r>
-              <a:rPr lang="nb-NO" smtClean="0"/>
+              <a:rPr lang="nb-NO"/>
               <a:t>Klikk for å redigere tittelstil</a:t>
             </a:r>
-            <a:endParaRPr lang="nb-NO"/>
           </a:p>
         </p:txBody>
       </p:sp>
@@ -988,7 +1004,7 @@
           <a:p>
             <a:pPr lvl="0"/>
             <a:r>
-              <a:rPr lang="nb-NO" smtClean="0"/>
+              <a:rPr lang="nb-NO"/>
               <a:t>Klikk for å redigere tekststiler i malen</a:t>
             </a:r>
           </a:p>
@@ -1121,10 +1137,9 @@
           <a:lstStyle/>
           <a:p>
             <a:r>
-              <a:rPr lang="nb-NO" smtClean="0"/>
+              <a:rPr lang="nb-NO"/>
               <a:t>Klikk for å redigere tittelstil</a:t>
             </a:r>
-            <a:endParaRPr lang="nb-NO"/>
           </a:p>
         </p:txBody>
       </p:sp>
@@ -1145,38 +1160,37 @@
           <a:p>
             <a:pPr lvl="0"/>
             <a:r>
-              <a:rPr lang="nb-NO" smtClean="0"/>
+              <a:rPr lang="nb-NO"/>
               <a:t>Klikk for å redigere tekststiler i malen</a:t>
             </a:r>
           </a:p>
           <a:p>
             <a:pPr lvl="1"/>
             <a:r>
-              <a:rPr lang="nb-NO" smtClean="0"/>
+              <a:rPr lang="nb-NO"/>
               <a:t>Andre nivå</a:t>
             </a:r>
           </a:p>
           <a:p>
             <a:pPr lvl="2"/>
             <a:r>
-              <a:rPr lang="nb-NO" smtClean="0"/>
+              <a:rPr lang="nb-NO"/>
               <a:t>Tredje nivå</a:t>
             </a:r>
           </a:p>
           <a:p>
             <a:pPr lvl="3"/>
             <a:r>
-              <a:rPr lang="nb-NO" smtClean="0"/>
+              <a:rPr lang="nb-NO"/>
               <a:t>Fjerde nivå</a:t>
             </a:r>
           </a:p>
           <a:p>
             <a:pPr lvl="4"/>
             <a:r>
-              <a:rPr lang="nb-NO" smtClean="0"/>
+              <a:rPr lang="nb-NO"/>
               <a:t>Femte nivå</a:t>
             </a:r>
-            <a:endParaRPr lang="nb-NO"/>
           </a:p>
         </p:txBody>
       </p:sp>
@@ -1312,10 +1326,9 @@
           <a:lstStyle/>
           <a:p>
             <a:r>
-              <a:rPr lang="nb-NO" smtClean="0"/>
+              <a:rPr lang="nb-NO"/>
               <a:t>Klikk for å redigere tittelstil</a:t>
             </a:r>
-            <a:endParaRPr lang="nb-NO"/>
           </a:p>
         </p:txBody>
       </p:sp>
@@ -1341,38 +1354,37 @@
           <a:p>
             <a:pPr lvl="0"/>
             <a:r>
-              <a:rPr lang="nb-NO" smtClean="0"/>
+              <a:rPr lang="nb-NO"/>
               <a:t>Klikk for å redigere tekststiler i malen</a:t>
             </a:r>
           </a:p>
           <a:p>
             <a:pPr lvl="1"/>
             <a:r>
-              <a:rPr lang="nb-NO" smtClean="0"/>
+              <a:rPr lang="nb-NO"/>
               <a:t>Andre nivå</a:t>
             </a:r>
           </a:p>
           <a:p>
             <a:pPr lvl="2"/>
             <a:r>
-              <a:rPr lang="nb-NO" smtClean="0"/>
+              <a:rPr lang="nb-NO"/>
               <a:t>Tredje nivå</a:t>
             </a:r>
           </a:p>
           <a:p>
             <a:pPr lvl="3"/>
             <a:r>
-              <a:rPr lang="nb-NO" smtClean="0"/>
+              <a:rPr lang="nb-NO"/>
               <a:t>Fjerde nivå</a:t>
             </a:r>
           </a:p>
           <a:p>
             <a:pPr lvl="4"/>
             <a:r>
-              <a:rPr lang="nb-NO" smtClean="0"/>
+              <a:rPr lang="nb-NO"/>
               <a:t>Femte nivå</a:t>
             </a:r>
-            <a:endParaRPr lang="nb-NO"/>
           </a:p>
         </p:txBody>
       </p:sp>
@@ -1512,10 +1524,9 @@
           </a:lstStyle>
           <a:p>
             <a:r>
-              <a:rPr lang="nb-NO" dirty="0" smtClean="0"/>
+              <a:rPr lang="nb-NO" dirty="0"/>
               <a:t>Klikk for å redigere tittelstil</a:t>
             </a:r>
-            <a:endParaRPr lang="nb-NO" dirty="0"/>
           </a:p>
         </p:txBody>
       </p:sp>
@@ -1565,10 +1576,9 @@
           <a:lstStyle/>
           <a:p>
             <a:r>
-              <a:rPr lang="nb-NO" smtClean="0"/>
+              <a:rPr lang="nb-NO"/>
               <a:t>Klikk for å redigere tittelstil</a:t>
             </a:r>
-            <a:endParaRPr lang="nb-NO"/>
           </a:p>
         </p:txBody>
       </p:sp>
@@ -1594,38 +1604,37 @@
           <a:p>
             <a:pPr lvl="0"/>
             <a:r>
-              <a:rPr lang="nb-NO" smtClean="0"/>
+              <a:rPr lang="nb-NO"/>
               <a:t>Klikk for å redigere tekststiler i malen</a:t>
             </a:r>
           </a:p>
           <a:p>
             <a:pPr lvl="1"/>
             <a:r>
-              <a:rPr lang="nb-NO" smtClean="0"/>
+              <a:rPr lang="nb-NO"/>
               <a:t>Andre nivå</a:t>
             </a:r>
           </a:p>
           <a:p>
             <a:pPr lvl="2"/>
             <a:r>
-              <a:rPr lang="nb-NO" smtClean="0"/>
+              <a:rPr lang="nb-NO"/>
               <a:t>Tredje nivå</a:t>
             </a:r>
           </a:p>
           <a:p>
             <a:pPr lvl="3"/>
             <a:r>
-              <a:rPr lang="nb-NO" smtClean="0"/>
+              <a:rPr lang="nb-NO"/>
               <a:t>Fjerde nivå</a:t>
             </a:r>
           </a:p>
           <a:p>
             <a:pPr lvl="4"/>
             <a:r>
-              <a:rPr lang="nb-NO" smtClean="0"/>
+              <a:rPr lang="nb-NO"/>
               <a:t>Femte nivå</a:t>
             </a:r>
-            <a:endParaRPr lang="nb-NO"/>
           </a:p>
         </p:txBody>
       </p:sp>
@@ -1679,10 +1688,9 @@
           </a:lstStyle>
           <a:p>
             <a:r>
-              <a:rPr lang="nb-NO" smtClean="0"/>
+              <a:rPr lang="nb-NO"/>
               <a:t>Klikk for å redigere tittelstil</a:t>
             </a:r>
-            <a:endParaRPr lang="nb-NO"/>
           </a:p>
         </p:txBody>
       </p:sp>
@@ -1799,7 +1807,7 @@
           <a:p>
             <a:pPr lvl="0"/>
             <a:r>
-              <a:rPr lang="nb-NO" smtClean="0"/>
+              <a:rPr lang="nb-NO"/>
               <a:t>Klikk for å redigere tekststiler i malen</a:t>
             </a:r>
           </a:p>
@@ -1932,10 +1940,9 @@
           <a:lstStyle/>
           <a:p>
             <a:r>
-              <a:rPr lang="nb-NO" smtClean="0"/>
+              <a:rPr lang="nb-NO"/>
               <a:t>Klikk for å redigere tittelstil</a:t>
             </a:r>
-            <a:endParaRPr lang="nb-NO"/>
           </a:p>
         </p:txBody>
       </p:sp>
@@ -1989,38 +1996,37 @@
           <a:p>
             <a:pPr lvl="0"/>
             <a:r>
-              <a:rPr lang="nb-NO" smtClean="0"/>
+              <a:rPr lang="nb-NO"/>
               <a:t>Klikk for å redigere tekststiler i malen</a:t>
             </a:r>
           </a:p>
           <a:p>
             <a:pPr lvl="1"/>
             <a:r>
-              <a:rPr lang="nb-NO" smtClean="0"/>
+              <a:rPr lang="nb-NO"/>
               <a:t>Andre nivå</a:t>
             </a:r>
           </a:p>
           <a:p>
             <a:pPr lvl="2"/>
             <a:r>
-              <a:rPr lang="nb-NO" smtClean="0"/>
+              <a:rPr lang="nb-NO"/>
               <a:t>Tredje nivå</a:t>
             </a:r>
           </a:p>
           <a:p>
             <a:pPr lvl="3"/>
             <a:r>
-              <a:rPr lang="nb-NO" smtClean="0"/>
+              <a:rPr lang="nb-NO"/>
               <a:t>Fjerde nivå</a:t>
             </a:r>
           </a:p>
           <a:p>
             <a:pPr lvl="4"/>
             <a:r>
-              <a:rPr lang="nb-NO" smtClean="0"/>
+              <a:rPr lang="nb-NO"/>
               <a:t>Femte nivå</a:t>
             </a:r>
-            <a:endParaRPr lang="nb-NO"/>
           </a:p>
         </p:txBody>
       </p:sp>
@@ -2074,38 +2080,37 @@
           <a:p>
             <a:pPr lvl="0"/>
             <a:r>
-              <a:rPr lang="nb-NO" smtClean="0"/>
+              <a:rPr lang="nb-NO"/>
               <a:t>Klikk for å redigere tekststiler i malen</a:t>
             </a:r>
           </a:p>
           <a:p>
             <a:pPr lvl="1"/>
             <a:r>
-              <a:rPr lang="nb-NO" smtClean="0"/>
+              <a:rPr lang="nb-NO"/>
               <a:t>Andre nivå</a:t>
             </a:r>
           </a:p>
           <a:p>
             <a:pPr lvl="2"/>
             <a:r>
-              <a:rPr lang="nb-NO" smtClean="0"/>
+              <a:rPr lang="nb-NO"/>
               <a:t>Tredje nivå</a:t>
             </a:r>
           </a:p>
           <a:p>
             <a:pPr lvl="3"/>
             <a:r>
-              <a:rPr lang="nb-NO" smtClean="0"/>
+              <a:rPr lang="nb-NO"/>
               <a:t>Fjerde nivå</a:t>
             </a:r>
           </a:p>
           <a:p>
             <a:pPr lvl="4"/>
             <a:r>
-              <a:rPr lang="nb-NO" smtClean="0"/>
+              <a:rPr lang="nb-NO"/>
               <a:t>Femte nivå</a:t>
             </a:r>
-            <a:endParaRPr lang="nb-NO"/>
           </a:p>
         </p:txBody>
       </p:sp>
@@ -2240,10 +2245,9 @@
           </a:lstStyle>
           <a:p>
             <a:r>
-              <a:rPr lang="nb-NO" smtClean="0"/>
+              <a:rPr lang="nb-NO"/>
               <a:t>Klikk for å redigere tittelstil</a:t>
             </a:r>
-            <a:endParaRPr lang="nb-NO"/>
           </a:p>
         </p:txBody>
       </p:sp>
@@ -2306,7 +2310,7 @@
           <a:p>
             <a:pPr lvl="0"/>
             <a:r>
-              <a:rPr lang="nb-NO" smtClean="0"/>
+              <a:rPr lang="nb-NO"/>
               <a:t>Klikk for å redigere tekststiler i malen</a:t>
             </a:r>
           </a:p>
@@ -2362,38 +2366,37 @@
           <a:p>
             <a:pPr lvl="0"/>
             <a:r>
-              <a:rPr lang="nb-NO" smtClean="0"/>
+              <a:rPr lang="nb-NO"/>
               <a:t>Klikk for å redigere tekststiler i malen</a:t>
             </a:r>
           </a:p>
           <a:p>
             <a:pPr lvl="1"/>
             <a:r>
-              <a:rPr lang="nb-NO" smtClean="0"/>
+              <a:rPr lang="nb-NO"/>
               <a:t>Andre nivå</a:t>
             </a:r>
           </a:p>
           <a:p>
             <a:pPr lvl="2"/>
             <a:r>
-              <a:rPr lang="nb-NO" smtClean="0"/>
+              <a:rPr lang="nb-NO"/>
               <a:t>Tredje nivå</a:t>
             </a:r>
           </a:p>
           <a:p>
             <a:pPr lvl="3"/>
             <a:r>
-              <a:rPr lang="nb-NO" smtClean="0"/>
+              <a:rPr lang="nb-NO"/>
               <a:t>Fjerde nivå</a:t>
             </a:r>
           </a:p>
           <a:p>
             <a:pPr lvl="4"/>
             <a:r>
-              <a:rPr lang="nb-NO" smtClean="0"/>
+              <a:rPr lang="nb-NO"/>
               <a:t>Femte nivå</a:t>
             </a:r>
-            <a:endParaRPr lang="nb-NO"/>
           </a:p>
         </p:txBody>
       </p:sp>
@@ -2456,7 +2459,7 @@
           <a:p>
             <a:pPr lvl="0"/>
             <a:r>
-              <a:rPr lang="nb-NO" smtClean="0"/>
+              <a:rPr lang="nb-NO"/>
               <a:t>Klikk for å redigere tekststiler i malen</a:t>
             </a:r>
           </a:p>
@@ -2512,38 +2515,37 @@
           <a:p>
             <a:pPr lvl="0"/>
             <a:r>
-              <a:rPr lang="nb-NO" smtClean="0"/>
+              <a:rPr lang="nb-NO"/>
               <a:t>Klikk for å redigere tekststiler i malen</a:t>
             </a:r>
           </a:p>
           <a:p>
             <a:pPr lvl="1"/>
             <a:r>
-              <a:rPr lang="nb-NO" smtClean="0"/>
+              <a:rPr lang="nb-NO"/>
               <a:t>Andre nivå</a:t>
             </a:r>
           </a:p>
           <a:p>
             <a:pPr lvl="2"/>
             <a:r>
-              <a:rPr lang="nb-NO" smtClean="0"/>
+              <a:rPr lang="nb-NO"/>
               <a:t>Tredje nivå</a:t>
             </a:r>
           </a:p>
           <a:p>
             <a:pPr lvl="3"/>
             <a:r>
-              <a:rPr lang="nb-NO" smtClean="0"/>
+              <a:rPr lang="nb-NO"/>
               <a:t>Fjerde nivå</a:t>
             </a:r>
           </a:p>
           <a:p>
             <a:pPr lvl="4"/>
             <a:r>
-              <a:rPr lang="nb-NO" smtClean="0"/>
+              <a:rPr lang="nb-NO"/>
               <a:t>Femte nivå</a:t>
             </a:r>
-            <a:endParaRPr lang="nb-NO"/>
           </a:p>
         </p:txBody>
       </p:sp>
@@ -2688,10 +2690,9 @@
           <a:lstStyle/>
           <a:p>
             <a:r>
-              <a:rPr lang="nb-NO" smtClean="0"/>
+              <a:rPr lang="nb-NO"/>
               <a:t>Klikk for å redigere tittelstil</a:t>
             </a:r>
-            <a:endParaRPr lang="nb-NO"/>
           </a:p>
         </p:txBody>
       </p:sp>
@@ -2946,10 +2947,9 @@
           </a:lstStyle>
           <a:p>
             <a:r>
-              <a:rPr lang="nb-NO" smtClean="0"/>
+              <a:rPr lang="nb-NO"/>
               <a:t>Klikk for å redigere tittelstil</a:t>
             </a:r>
-            <a:endParaRPr lang="nb-NO"/>
           </a:p>
         </p:txBody>
       </p:sp>
@@ -3003,38 +3003,37 @@
           <a:p>
             <a:pPr lvl="0"/>
             <a:r>
-              <a:rPr lang="nb-NO" smtClean="0"/>
+              <a:rPr lang="nb-NO"/>
               <a:t>Klikk for å redigere tekststiler i malen</a:t>
             </a:r>
           </a:p>
           <a:p>
             <a:pPr lvl="1"/>
             <a:r>
-              <a:rPr lang="nb-NO" smtClean="0"/>
+              <a:rPr lang="nb-NO"/>
               <a:t>Andre nivå</a:t>
             </a:r>
           </a:p>
           <a:p>
             <a:pPr lvl="2"/>
             <a:r>
-              <a:rPr lang="nb-NO" smtClean="0"/>
+              <a:rPr lang="nb-NO"/>
               <a:t>Tredje nivå</a:t>
             </a:r>
           </a:p>
           <a:p>
             <a:pPr lvl="3"/>
             <a:r>
-              <a:rPr lang="nb-NO" smtClean="0"/>
+              <a:rPr lang="nb-NO"/>
               <a:t>Fjerde nivå</a:t>
             </a:r>
           </a:p>
           <a:p>
             <a:pPr lvl="4"/>
             <a:r>
-              <a:rPr lang="nb-NO" smtClean="0"/>
+              <a:rPr lang="nb-NO"/>
               <a:t>Femte nivå</a:t>
             </a:r>
-            <a:endParaRPr lang="nb-NO"/>
           </a:p>
         </p:txBody>
       </p:sp>
@@ -3097,7 +3096,7 @@
           <a:p>
             <a:pPr lvl="0"/>
             <a:r>
-              <a:rPr lang="nb-NO" smtClean="0"/>
+              <a:rPr lang="nb-NO"/>
               <a:t>Klikk for å redigere tekststiler i malen</a:t>
             </a:r>
           </a:p>
@@ -3250,10 +3249,9 @@
           <a:lstStyle/>
           <a:p>
             <a:r>
-              <a:rPr lang="nb-NO" dirty="0" smtClean="0"/>
+              <a:rPr lang="nb-NO" dirty="0"/>
               <a:t>Klikk for å redigere tittelstil</a:t>
             </a:r>
-            <a:endParaRPr lang="nb-NO" dirty="0"/>
           </a:p>
         </p:txBody>
       </p:sp>
@@ -3284,38 +3282,37 @@
           <a:p>
             <a:pPr lvl="0"/>
             <a:r>
-              <a:rPr lang="nb-NO" dirty="0" smtClean="0"/>
+              <a:rPr lang="nb-NO" dirty="0"/>
               <a:t>Klikk for å redigere tekststiler i malen</a:t>
             </a:r>
           </a:p>
           <a:p>
             <a:pPr lvl="1"/>
             <a:r>
-              <a:rPr lang="nb-NO" dirty="0" smtClean="0"/>
+              <a:rPr lang="nb-NO" dirty="0"/>
               <a:t>Andre nivå</a:t>
             </a:r>
           </a:p>
           <a:p>
             <a:pPr lvl="2"/>
             <a:r>
-              <a:rPr lang="nb-NO" dirty="0" smtClean="0"/>
+              <a:rPr lang="nb-NO" dirty="0"/>
               <a:t>Tredje nivå</a:t>
             </a:r>
           </a:p>
           <a:p>
             <a:pPr lvl="3"/>
             <a:r>
-              <a:rPr lang="nb-NO" dirty="0" smtClean="0"/>
+              <a:rPr lang="nb-NO" dirty="0"/>
               <a:t>Fjerde nivå</a:t>
             </a:r>
           </a:p>
           <a:p>
             <a:pPr lvl="4"/>
             <a:r>
-              <a:rPr lang="nb-NO" dirty="0" smtClean="0"/>
+              <a:rPr lang="nb-NO" dirty="0"/>
               <a:t>Femte nivå</a:t>
             </a:r>
-            <a:endParaRPr lang="nb-NO" dirty="0"/>
           </a:p>
         </p:txBody>
       </p:sp>
@@ -3442,7 +3439,7 @@
           <a:lstStyle/>
           <a:p>
             <a:r>
-              <a:rPr lang="nb-NO" sz="1000" b="0" dirty="0" err="1" smtClean="0">
+              <a:rPr lang="nb-NO" sz="1000" b="0" dirty="0" err="1">
                 <a:solidFill>
                   <a:schemeClr val="tx1"/>
                 </a:solidFill>
@@ -3452,7 +3449,7 @@
               <a:t>Virtual</a:t>
             </a:r>
             <a:r>
-              <a:rPr lang="nb-NO" sz="1000" b="0" dirty="0" smtClean="0">
+              <a:rPr lang="nb-NO" sz="1000" b="0" dirty="0">
                 <a:solidFill>
                   <a:schemeClr val="tx1"/>
                 </a:solidFill>
@@ -3462,7 +3459,7 @@
               <a:t> </a:t>
             </a:r>
             <a:r>
-              <a:rPr lang="nb-NO" sz="1000" b="0" dirty="0" err="1" smtClean="0">
+              <a:rPr lang="nb-NO" sz="1000" b="0" dirty="0" err="1">
                 <a:solidFill>
                   <a:schemeClr val="tx1"/>
                 </a:solidFill>
@@ -3472,7 +3469,7 @@
               <a:t>Intelligence</a:t>
             </a:r>
             <a:r>
-              <a:rPr lang="nb-NO" sz="1000" b="0" dirty="0" smtClean="0">
+              <a:rPr lang="nb-NO" sz="1000" b="0" dirty="0">
                 <a:solidFill>
                   <a:schemeClr val="tx1"/>
                 </a:solidFill>
@@ -3482,7 +3479,7 @@
               <a:t> </a:t>
             </a:r>
             <a:r>
-              <a:rPr lang="nb-NO" sz="1000" b="0" dirty="0" err="1" smtClean="0">
+              <a:rPr lang="nb-NO" sz="1000" b="0" dirty="0" err="1">
                 <a:solidFill>
                   <a:schemeClr val="tx1"/>
                 </a:solidFill>
@@ -3525,7 +3522,7 @@
           <a:p>
             <a:pPr algn="ctr"/>
             <a:r>
-              <a:rPr lang="nb-NO" sz="700" b="1" i="1" dirty="0" smtClean="0">
+              <a:rPr lang="nb-NO" sz="700" b="1" i="1" dirty="0">
                 <a:solidFill>
                   <a:schemeClr val="bg1"/>
                 </a:solidFill>
@@ -3533,12 +3530,6 @@
               </a:rPr>
               <a:t>OMNIA VINCENT SAPIENTA</a:t>
             </a:r>
-            <a:endParaRPr lang="nb-NO" sz="700" b="1" i="1" dirty="0">
-              <a:solidFill>
-                <a:schemeClr val="bg1"/>
-              </a:solidFill>
-              <a:latin typeface="Arial Black" pitchFamily="34" charset="0"/>
-            </a:endParaRPr>
           </a:p>
         </p:txBody>
       </p:sp>
@@ -3926,7 +3917,7 @@
           <a:p>
             <a:pPr algn="ctr"/>
             <a:r>
-              <a:rPr lang="nb-NO" sz="2800" b="1" dirty="0" smtClean="0">
+              <a:rPr lang="nb-NO" sz="2800" b="1" dirty="0">
                 <a:latin typeface="Arial Black" pitchFamily="34" charset="0"/>
                 <a:ea typeface="MS Mincho" pitchFamily="49" charset="-128"/>
               </a:rPr>
@@ -3935,7 +3926,7 @@
           </a:p>
           <a:p>
             <a:pPr algn="ctr"/>
-            <a:endParaRPr lang="nb-NO" sz="1400" b="1" dirty="0" smtClean="0">
+            <a:endParaRPr lang="nb-NO" sz="1400" b="1" dirty="0">
               <a:latin typeface="Arial Black" pitchFamily="34" charset="0"/>
               <a:ea typeface="MS Mincho" pitchFamily="49" charset="-128"/>
             </a:endParaRPr>
@@ -3943,7 +3934,7 @@
           <a:p>
             <a:pPr algn="ctr"/>
             <a:r>
-              <a:rPr lang="nb-NO" sz="2800" b="1" dirty="0" smtClean="0">
+              <a:rPr lang="nb-NO" sz="2800" b="1" dirty="0">
                 <a:latin typeface="Arial Black" pitchFamily="34" charset="0"/>
                 <a:ea typeface="MS Mincho" pitchFamily="49" charset="-128"/>
               </a:rPr>
@@ -3985,17 +3976,17 @@
           <a:p>
             <a:pPr algn="ctr"/>
             <a:r>
-              <a:rPr lang="nb-NO" sz="1100" b="1" dirty="0" smtClean="0"/>
+              <a:rPr lang="nb-NO" sz="1100" b="1" dirty="0"/>
               <a:t>DISCLAIMER: </a:t>
             </a:r>
           </a:p>
           <a:p>
             <a:pPr algn="ctr"/>
             <a:r>
-              <a:rPr lang="en-US" sz="1100" dirty="0" smtClean="0"/>
+              <a:rPr lang="en-US" sz="1100" dirty="0"/>
               <a:t>This is for multiplayer online gaming using the Digital Combat Systems simulation software published by Eagle Dynamics. The information is not in any way suitable for real world use or operations.</a:t>
             </a:r>
-            <a:endParaRPr lang="nb-NO" sz="1100" dirty="0" smtClean="0"/>
+            <a:endParaRPr lang="nb-NO" sz="1100" dirty="0"/>
           </a:p>
         </p:txBody>
       </p:sp>
@@ -4023,16 +4014,12 @@
           <a:p>
             <a:pPr algn="ctr"/>
             <a:r>
-              <a:rPr lang="en-US" sz="1400" dirty="0" smtClean="0">
+              <a:rPr lang="en-US" sz="1400" dirty="0">
                 <a:latin typeface="Arial" pitchFamily="34" charset="0"/>
                 <a:cs typeface="Arial" pitchFamily="34" charset="0"/>
               </a:rPr>
               <a:t>Published: 2021-11-15</a:t>
             </a:r>
-            <a:endParaRPr lang="en-US" sz="1400" dirty="0">
-              <a:latin typeface="Arial" pitchFamily="34" charset="0"/>
-              <a:cs typeface="Arial" pitchFamily="34" charset="0"/>
-            </a:endParaRPr>
           </a:p>
         </p:txBody>
       </p:sp>
@@ -4060,23 +4047,12 @@
           <a:p>
             <a:pPr algn="ctr"/>
             <a:r>
-              <a:rPr lang="en-US" sz="1400" dirty="0" smtClean="0">
+              <a:rPr lang="en-US" sz="1400" dirty="0">
                 <a:latin typeface="Arial" pitchFamily="34" charset="0"/>
                 <a:cs typeface="Arial" pitchFamily="34" charset="0"/>
               </a:rPr>
-              <a:t>Version: </a:t>
-            </a:r>
-            <a:r>
-              <a:rPr lang="en-US" sz="1400" dirty="0" smtClean="0">
-                <a:latin typeface="Arial" pitchFamily="34" charset="0"/>
-                <a:cs typeface="Arial" pitchFamily="34" charset="0"/>
-              </a:rPr>
-              <a:t>2.0</a:t>
-            </a:r>
-            <a:endParaRPr lang="en-US" sz="1400" dirty="0">
-              <a:latin typeface="Arial" pitchFamily="34" charset="0"/>
-              <a:cs typeface="Arial" pitchFamily="34" charset="0"/>
-            </a:endParaRPr>
+              <a:t>Version: 2.1</a:t>
+            </a:r>
           </a:p>
         </p:txBody>
       </p:sp>
@@ -4104,7 +4080,7 @@
           <a:p>
             <a:pPr algn="ctr"/>
             <a:r>
-              <a:rPr lang="en-US" sz="2400" b="1" dirty="0" smtClean="0">
+              <a:rPr lang="en-US" sz="2400" b="1" dirty="0">
                 <a:solidFill>
                   <a:srgbClr val="35261F"/>
                 </a:solidFill>
@@ -4116,7 +4092,7 @@
           <a:p>
             <a:pPr algn="ctr"/>
             <a:r>
-              <a:rPr lang="en-US" b="1" i="1" dirty="0" smtClean="0">
+              <a:rPr lang="en-US" b="1" i="1" dirty="0">
                 <a:solidFill>
                   <a:srgbClr val="35261F"/>
                 </a:solidFill>
@@ -4124,12 +4100,6 @@
               </a:rPr>
               <a:t>OMNIA VINCIT SAPIENTIA</a:t>
             </a:r>
-            <a:endParaRPr lang="en-US" b="1" i="1" dirty="0">
-              <a:solidFill>
-                <a:srgbClr val="35261F"/>
-              </a:solidFill>
-              <a:latin typeface="Constantia" pitchFamily="18" charset="0"/>
-            </a:endParaRPr>
           </a:p>
         </p:txBody>
       </p:sp>
@@ -4164,13 +4134,6 @@
   <p:clrMapOvr>
     <a:masterClrMapping/>
   </p:clrMapOvr>
-  <p:timing>
-    <p:tnLst>
-      <p:par>
-        <p:cTn id="1" dur="indefinite" restart="never" nodeType="tmRoot"/>
-      </p:par>
-    </p:tnLst>
-  </p:timing>
 </p:sld>
 </file>
 
@@ -4207,10 +4170,9 @@
           <a:lstStyle/>
           <a:p>
             <a:r>
-              <a:rPr lang="en-US" dirty="0" smtClean="0"/>
+              <a:rPr lang="en-US" dirty="0"/>
               <a:t>INDICATORS</a:t>
             </a:r>
-            <a:endParaRPr lang="en-US" dirty="0"/>
           </a:p>
         </p:txBody>
       </p:sp>
@@ -4243,14 +4205,14 @@
               <a:buFont typeface="Arial" pitchFamily="34" charset="0"/>
               <a:buChar char="•"/>
             </a:pPr>
-            <a:endParaRPr lang="nb-NO" sz="1200" dirty="0" smtClean="0"/>
+            <a:endParaRPr lang="nb-NO" sz="1200" dirty="0"/>
           </a:p>
           <a:p>
             <a:pPr>
               <a:buFont typeface="Arial" pitchFamily="34" charset="0"/>
               <a:buChar char="•"/>
             </a:pPr>
-            <a:endParaRPr lang="nb-NO" sz="1200" dirty="0" smtClean="0"/>
+            <a:endParaRPr lang="nb-NO" sz="1200" dirty="0"/>
           </a:p>
         </p:txBody>
       </p:sp>
@@ -4299,10 +4261,9 @@
           <a:p>
             <a:pPr algn="ctr"/>
             <a:r>
-              <a:rPr lang="nb-NO" sz="1200" dirty="0" smtClean="0"/>
+              <a:rPr lang="nb-NO" sz="1200" dirty="0"/>
               <a:t>A</a:t>
             </a:r>
-            <a:endParaRPr lang="nb-NO" sz="1200" dirty="0"/>
           </a:p>
         </p:txBody>
       </p:sp>
@@ -4351,10 +4312,9 @@
           <a:p>
             <a:pPr algn="ctr"/>
             <a:r>
-              <a:rPr lang="nb-NO" sz="1200" dirty="0" smtClean="0"/>
+              <a:rPr lang="nb-NO" sz="1200" dirty="0"/>
               <a:t>A</a:t>
             </a:r>
-            <a:endParaRPr lang="nb-NO" sz="1200" dirty="0"/>
           </a:p>
         </p:txBody>
       </p:sp>
@@ -4403,10 +4363,9 @@
           <a:p>
             <a:pPr algn="ctr"/>
             <a:r>
-              <a:rPr lang="nb-NO" sz="1200" dirty="0" smtClean="0"/>
+              <a:rPr lang="nb-NO" sz="1200" dirty="0"/>
               <a:t>B</a:t>
             </a:r>
-            <a:endParaRPr lang="nb-NO" sz="1200" dirty="0"/>
           </a:p>
         </p:txBody>
       </p:sp>
@@ -4455,10 +4414,9 @@
           <a:p>
             <a:pPr algn="ctr"/>
             <a:r>
-              <a:rPr lang="nb-NO" sz="1200" dirty="0" smtClean="0"/>
+              <a:rPr lang="nb-NO" sz="1200" dirty="0"/>
               <a:t>B</a:t>
             </a:r>
-            <a:endParaRPr lang="nb-NO" sz="1200" dirty="0"/>
           </a:p>
         </p:txBody>
       </p:sp>
@@ -4507,10 +4465,9 @@
           <a:p>
             <a:pPr algn="ctr"/>
             <a:r>
-              <a:rPr lang="nb-NO" sz="1200" dirty="0" smtClean="0"/>
+              <a:rPr lang="nb-NO" sz="1200" dirty="0"/>
               <a:t>C</a:t>
             </a:r>
-            <a:endParaRPr lang="nb-NO" sz="1200" dirty="0"/>
           </a:p>
         </p:txBody>
       </p:sp>
@@ -4559,10 +4516,9 @@
           <a:p>
             <a:pPr algn="ctr"/>
             <a:r>
-              <a:rPr lang="nb-NO" sz="1200" dirty="0" smtClean="0"/>
+              <a:rPr lang="nb-NO" sz="1200" dirty="0"/>
               <a:t>C</a:t>
             </a:r>
-            <a:endParaRPr lang="nb-NO" sz="1200" dirty="0"/>
           </a:p>
         </p:txBody>
       </p:sp>
@@ -4611,10 +4567,9 @@
           <a:p>
             <a:pPr algn="ctr"/>
             <a:r>
-              <a:rPr lang="nb-NO" sz="1200" dirty="0" smtClean="0"/>
+              <a:rPr lang="nb-NO" sz="1200" dirty="0"/>
               <a:t>D</a:t>
             </a:r>
-            <a:endParaRPr lang="nb-NO" sz="1200" dirty="0"/>
           </a:p>
         </p:txBody>
       </p:sp>
@@ -4663,10 +4618,9 @@
           <a:p>
             <a:pPr algn="ctr"/>
             <a:r>
-              <a:rPr lang="nb-NO" sz="1200" dirty="0" smtClean="0"/>
+              <a:rPr lang="nb-NO" sz="1200" dirty="0"/>
               <a:t>D</a:t>
             </a:r>
-            <a:endParaRPr lang="nb-NO" sz="1200" dirty="0"/>
           </a:p>
         </p:txBody>
       </p:sp>
@@ -4715,10 +4669,9 @@
           <a:p>
             <a:pPr algn="ctr"/>
             <a:r>
-              <a:rPr lang="nb-NO" sz="1200" dirty="0" smtClean="0"/>
+              <a:rPr lang="nb-NO" sz="1200" dirty="0"/>
               <a:t>E</a:t>
             </a:r>
-            <a:endParaRPr lang="nb-NO" sz="1200" dirty="0"/>
           </a:p>
         </p:txBody>
       </p:sp>
@@ -4767,10 +4720,9 @@
           <a:p>
             <a:pPr algn="ctr"/>
             <a:r>
-              <a:rPr lang="nb-NO" sz="1200" dirty="0" smtClean="0"/>
+              <a:rPr lang="nb-NO" sz="1200" dirty="0"/>
               <a:t>E</a:t>
             </a:r>
-            <a:endParaRPr lang="nb-NO" sz="1200" dirty="0"/>
           </a:p>
         </p:txBody>
       </p:sp>
@@ -4819,10 +4771,9 @@
           <a:p>
             <a:pPr algn="ctr"/>
             <a:r>
-              <a:rPr lang="nb-NO" sz="1200" dirty="0" smtClean="0"/>
+              <a:rPr lang="nb-NO" sz="1200" dirty="0"/>
               <a:t>F</a:t>
             </a:r>
-            <a:endParaRPr lang="nb-NO" sz="1200" dirty="0"/>
           </a:p>
         </p:txBody>
       </p:sp>
@@ -4871,10 +4822,9 @@
           <a:p>
             <a:pPr algn="ctr"/>
             <a:r>
-              <a:rPr lang="nb-NO" sz="1200" dirty="0" smtClean="0"/>
+              <a:rPr lang="nb-NO" sz="1200" dirty="0"/>
               <a:t>F</a:t>
             </a:r>
-            <a:endParaRPr lang="nb-NO" sz="1200" dirty="0"/>
           </a:p>
         </p:txBody>
       </p:sp>
@@ -4901,7 +4851,7 @@
           <a:lstStyle/>
           <a:p>
             <a:r>
-              <a:rPr lang="en-US" sz="4000" b="1" dirty="0" smtClean="0">
+              <a:rPr lang="en-US" sz="4000" b="1" dirty="0">
                 <a:solidFill>
                   <a:srgbClr val="FF0000"/>
                 </a:solidFill>
@@ -4909,12 +4859,6 @@
               </a:rPr>
               <a:t>DRAFT</a:t>
             </a:r>
-            <a:endParaRPr lang="en-US" sz="4000" b="1" dirty="0">
-              <a:solidFill>
-                <a:srgbClr val="FF0000"/>
-              </a:solidFill>
-              <a:latin typeface="Arial Black" pitchFamily="34" charset="0"/>
-            </a:endParaRPr>
           </a:p>
         </p:txBody>
       </p:sp>
@@ -4927,7 +4871,7 @@
           <p:nvPr>
             <p:extLst>
               <p:ext uri="{D42A27DB-BD31-4B8C-83A1-F6EECF244321}">
-                <p14:modId xmlns:p14="http://schemas.microsoft.com/office/powerpoint/2010/main" xmlns="" val="253851099"/>
+                <p14:modId xmlns:p14="http://schemas.microsoft.com/office/powerpoint/2010/main" val="253851099"/>
               </p:ext>
             </p:extLst>
           </p:nvPr>
@@ -4943,8 +4887,20 @@
                 <a:tableStyleId>{073A0DAA-6AF3-43AB-8588-CEC1D06C72B9}</a:tableStyleId>
               </a:tblPr>
               <a:tblGrid>
-                <a:gridCol w="4877626"/>
-                <a:gridCol w="3310192"/>
+                <a:gridCol w="4877626">
+                  <a:extLst>
+                    <a:ext uri="{9D8B030D-6E8A-4147-A177-3AD203B41FA5}">
+                      <a16:colId xmlns:a16="http://schemas.microsoft.com/office/drawing/2014/main" val="20000"/>
+                    </a:ext>
+                  </a:extLst>
+                </a:gridCol>
+                <a:gridCol w="3310192">
+                  <a:extLst>
+                    <a:ext uri="{9D8B030D-6E8A-4147-A177-3AD203B41FA5}">
+                      <a16:colId xmlns:a16="http://schemas.microsoft.com/office/drawing/2014/main" val="20001"/>
+                    </a:ext>
+                  </a:extLst>
+                </a:gridCol>
               </a:tblGrid>
               <a:tr h="523305">
                 <a:tc>
@@ -4954,7 +4910,7 @@
                     <a:p>
                       <a:pPr algn="l" rtl="0"/>
                       <a:r>
-                        <a:rPr lang="en-US" dirty="0" smtClean="0"/>
+                        <a:rPr lang="en-US" dirty="0"/>
                         <a:t>Indication</a:t>
                       </a:r>
                       <a:endParaRPr lang="he-IL" dirty="0"/>
@@ -4969,11 +4925,11 @@
                     <a:p>
                       <a:pPr algn="l" rtl="0"/>
                       <a:r>
-                        <a:rPr lang="en-US" dirty="0" smtClean="0"/>
+                        <a:rPr lang="en-US" dirty="0"/>
                         <a:t>Observed/reported</a:t>
                       </a:r>
                       <a:r>
-                        <a:rPr lang="en-US" baseline="0" dirty="0" smtClean="0"/>
+                        <a:rPr lang="en-US" baseline="0" dirty="0"/>
                         <a:t> activity</a:t>
                       </a:r>
                       <a:endParaRPr lang="he-IL" dirty="0"/>
@@ -4981,6 +4937,11 @@
                   </a:txBody>
                   <a:tcPr anchor="ctr"/>
                 </a:tc>
+                <a:extLst>
+                  <a:ext uri="{0D108BD9-81ED-4DB2-BD59-A6C34878D82A}">
+                    <a16:rowId xmlns:a16="http://schemas.microsoft.com/office/drawing/2014/main" val="10000"/>
+                  </a:ext>
+                </a:extLst>
               </a:tr>
               <a:tr h="370840">
                 <a:tc>
@@ -5006,11 +4967,11 @@
                         <a:defRPr/>
                       </a:pPr>
                       <a:r>
-                        <a:rPr lang="he-IL" sz="1200" dirty="0" smtClean="0"/>
+                        <a:rPr lang="he-IL" sz="1200" dirty="0"/>
                         <a:t> </a:t>
                       </a:r>
                       <a:r>
-                        <a:rPr lang="nb-NO" sz="1200" dirty="0" smtClean="0"/>
+                        <a:rPr lang="nb-NO" sz="1200" dirty="0"/>
                         <a:t>Preparing offensive / Attack </a:t>
                       </a:r>
                     </a:p>
@@ -5033,14 +4994,14 @@
                         <a:defRPr/>
                       </a:pPr>
                       <a:r>
-                        <a:rPr lang="nb-NO" sz="1200" dirty="0" smtClean="0"/>
+                        <a:rPr lang="nb-NO" sz="1200" dirty="0"/>
                         <a:t>(1-2</a:t>
                       </a:r>
                       <a:r>
-                        <a:rPr lang="nb-NO" sz="1200" baseline="0" dirty="0" smtClean="0"/>
+                        <a:rPr lang="nb-NO" sz="1200" baseline="0" dirty="0"/>
                         <a:t> hours prior to offensive maneuver begins)</a:t>
                       </a:r>
-                      <a:endParaRPr lang="nb-NO" sz="1200" dirty="0" smtClean="0"/>
+                      <a:endParaRPr lang="nb-NO" sz="1200" dirty="0"/>
                     </a:p>
                   </a:txBody>
                   <a:tcPr anchor="ctr"/>
@@ -5055,13 +5016,18 @@
                         <a:buNone/>
                       </a:pPr>
                       <a:r>
-                        <a:rPr lang="nb-NO" sz="1200" dirty="0" smtClean="0"/>
+                        <a:rPr lang="nb-NO" sz="1200" dirty="0"/>
                         <a:t>BM-21 launch or movement into firing positions. </a:t>
                       </a:r>
                     </a:p>
                   </a:txBody>
                   <a:tcPr anchor="ctr"/>
                 </a:tc>
+                <a:extLst>
+                  <a:ext uri="{0D108BD9-81ED-4DB2-BD59-A6C34878D82A}">
+                    <a16:rowId xmlns:a16="http://schemas.microsoft.com/office/drawing/2014/main" val="10001"/>
+                  </a:ext>
+                </a:extLst>
               </a:tr>
               <a:tr h="370840">
                 <a:tc>
@@ -5087,7 +5053,7 @@
                         <a:defRPr/>
                       </a:pPr>
                       <a:r>
-                        <a:rPr lang="nb-NO" sz="1200" dirty="0" smtClean="0"/>
+                        <a:rPr lang="nb-NO" sz="1200" dirty="0"/>
                         <a:t>Insertion of Long Range Recon</a:t>
                       </a:r>
                     </a:p>
@@ -5110,7 +5076,7 @@
                         <a:defRPr/>
                       </a:pPr>
                       <a:r>
-                        <a:rPr lang="nb-NO" sz="1200" dirty="0" smtClean="0"/>
+                        <a:rPr lang="nb-NO" sz="1200" dirty="0"/>
                         <a:t>(0-96 hrs prior to offensive)</a:t>
                       </a:r>
                     </a:p>
@@ -5127,13 +5093,18 @@
                         <a:buNone/>
                       </a:pPr>
                       <a:r>
-                        <a:rPr lang="nb-NO" sz="1200" dirty="0" smtClean="0"/>
+                        <a:rPr lang="nb-NO" sz="1200" dirty="0"/>
                         <a:t>RW activity deep into enemy territory</a:t>
                       </a:r>
                     </a:p>
                   </a:txBody>
                   <a:tcPr anchor="ctr"/>
                 </a:tc>
+                <a:extLst>
+                  <a:ext uri="{0D108BD9-81ED-4DB2-BD59-A6C34878D82A}">
+                    <a16:rowId xmlns:a16="http://schemas.microsoft.com/office/drawing/2014/main" val="10002"/>
+                  </a:ext>
+                </a:extLst>
               </a:tr>
               <a:tr h="370840">
                 <a:tc>
@@ -5146,7 +5117,7 @@
                         <a:buNone/>
                       </a:pPr>
                       <a:r>
-                        <a:rPr lang="nb-NO" sz="1200" dirty="0" smtClean="0"/>
+                        <a:rPr lang="nb-NO" sz="1200" dirty="0"/>
                         <a:t>*Airborne Assault ( Many FW transports)</a:t>
                       </a:r>
                     </a:p>
@@ -5156,15 +5127,15 @@
                         <a:buNone/>
                       </a:pPr>
                       <a:r>
-                        <a:rPr lang="nb-NO" sz="1200" dirty="0" smtClean="0"/>
+                        <a:rPr lang="nb-NO" sz="1200" dirty="0"/>
                         <a:t>*</a:t>
                       </a:r>
                       <a:r>
-                        <a:rPr lang="nb-NO" sz="1200" baseline="0" dirty="0" smtClean="0"/>
+                        <a:rPr lang="nb-NO" sz="1200" baseline="0" dirty="0"/>
                         <a:t> </a:t>
                       </a:r>
                       <a:r>
-                        <a:rPr lang="nb-NO" sz="1200" dirty="0" smtClean="0"/>
+                        <a:rPr lang="nb-NO" sz="1200" dirty="0"/>
                         <a:t>Long range Recon ( If only a single AC is in use, or flying tactical, low level)</a:t>
                       </a:r>
                     </a:p>
@@ -5181,13 +5152,18 @@
                         <a:buNone/>
                       </a:pPr>
                       <a:r>
-                        <a:rPr lang="nb-NO" sz="1200" dirty="0" smtClean="0"/>
+                        <a:rPr lang="nb-NO" sz="1200" dirty="0"/>
                         <a:t>FW (transport) activity deep into enemy territory</a:t>
                       </a:r>
                     </a:p>
                   </a:txBody>
                   <a:tcPr anchor="ctr"/>
                 </a:tc>
+                <a:extLst>
+                  <a:ext uri="{0D108BD9-81ED-4DB2-BD59-A6C34878D82A}">
+                    <a16:rowId xmlns:a16="http://schemas.microsoft.com/office/drawing/2014/main" val="10003"/>
+                  </a:ext>
+                </a:extLst>
               </a:tr>
               <a:tr h="370840">
                 <a:tc>
@@ -5213,7 +5189,7 @@
                         <a:defRPr/>
                       </a:pPr>
                       <a:r>
-                        <a:rPr lang="nb-NO" sz="1200" dirty="0" smtClean="0"/>
+                        <a:rPr lang="nb-NO" sz="1200" dirty="0"/>
                         <a:t>Trying to kill the target</a:t>
                       </a:r>
                     </a:p>
@@ -5230,13 +5206,18 @@
                         <a:buNone/>
                       </a:pPr>
                       <a:r>
-                        <a:rPr lang="nb-NO" sz="1200" dirty="0" smtClean="0"/>
+                        <a:rPr lang="nb-NO" sz="1200" dirty="0"/>
                         <a:t>Artillery at a certain point (point target)</a:t>
                       </a:r>
                     </a:p>
                   </a:txBody>
                   <a:tcPr anchor="ctr"/>
                 </a:tc>
+                <a:extLst>
+                  <a:ext uri="{0D108BD9-81ED-4DB2-BD59-A6C34878D82A}">
+                    <a16:rowId xmlns:a16="http://schemas.microsoft.com/office/drawing/2014/main" val="10004"/>
+                  </a:ext>
+                </a:extLst>
               </a:tr>
               <a:tr h="370840">
                 <a:tc>
@@ -5262,7 +5243,7 @@
                         <a:defRPr/>
                       </a:pPr>
                       <a:r>
-                        <a:rPr lang="nb-NO" sz="1200" dirty="0" smtClean="0"/>
+                        <a:rPr lang="nb-NO" sz="1200" dirty="0"/>
                         <a:t>Suppression, to cover for movement / attack</a:t>
                       </a:r>
                     </a:p>
@@ -5279,13 +5260,18 @@
                         <a:buNone/>
                       </a:pPr>
                       <a:r>
-                        <a:rPr lang="nb-NO" sz="1200" dirty="0" smtClean="0"/>
+                        <a:rPr lang="nb-NO" sz="1200" dirty="0"/>
                         <a:t>Artillery at an area</a:t>
                       </a:r>
                     </a:p>
                   </a:txBody>
                   <a:tcPr anchor="ctr"/>
                 </a:tc>
+                <a:extLst>
+                  <a:ext uri="{0D108BD9-81ED-4DB2-BD59-A6C34878D82A}">
+                    <a16:rowId xmlns:a16="http://schemas.microsoft.com/office/drawing/2014/main" val="10005"/>
+                  </a:ext>
+                </a:extLst>
               </a:tr>
               <a:tr h="370840">
                 <a:tc>
@@ -5298,15 +5284,15 @@
                         <a:buNone/>
                       </a:pPr>
                       <a:r>
-                        <a:rPr lang="nb-NO" sz="1200" dirty="0" smtClean="0"/>
+                        <a:rPr lang="nb-NO" sz="1200" dirty="0"/>
                         <a:t>Upcoming division-level</a:t>
                       </a:r>
                       <a:r>
-                        <a:rPr lang="nb-NO" sz="1200" baseline="0" dirty="0" smtClean="0"/>
+                        <a:rPr lang="nb-NO" sz="1200" baseline="0" dirty="0"/>
                         <a:t> </a:t>
                       </a:r>
                       <a:r>
-                        <a:rPr lang="nb-NO" sz="1200" dirty="0" smtClean="0"/>
+                        <a:rPr lang="nb-NO" sz="1200" dirty="0"/>
                         <a:t>offensive within 0-48 hrs</a:t>
                       </a:r>
                     </a:p>
@@ -5323,18 +5309,23 @@
                         <a:buNone/>
                       </a:pPr>
                       <a:r>
-                        <a:rPr lang="nb-NO" sz="1200" dirty="0" smtClean="0"/>
+                        <a:rPr lang="nb-NO" sz="1200" dirty="0"/>
                         <a:t>Convoys</a:t>
                       </a:r>
                       <a:r>
-                        <a:rPr lang="nb-NO" sz="1200" baseline="0" dirty="0" smtClean="0"/>
+                        <a:rPr lang="nb-NO" sz="1200" baseline="0" dirty="0"/>
                         <a:t> of division-level supply</a:t>
                       </a:r>
-                      <a:endParaRPr lang="nb-NO" sz="1200" dirty="0" smtClean="0"/>
+                      <a:endParaRPr lang="nb-NO" sz="1200" dirty="0"/>
                     </a:p>
                   </a:txBody>
                   <a:tcPr anchor="ctr"/>
                 </a:tc>
+                <a:extLst>
+                  <a:ext uri="{0D108BD9-81ED-4DB2-BD59-A6C34878D82A}">
+                    <a16:rowId xmlns:a16="http://schemas.microsoft.com/office/drawing/2014/main" val="10006"/>
+                  </a:ext>
+                </a:extLst>
               </a:tr>
               <a:tr h="370840">
                 <a:tc>
@@ -5347,7 +5338,7 @@
                         <a:buNone/>
                       </a:pPr>
                       <a:r>
-                        <a:rPr lang="nb-NO" sz="1200" dirty="0" smtClean="0"/>
+                        <a:rPr lang="nb-NO" sz="1200" dirty="0"/>
                         <a:t>Upcoming regiment-level offensive within 0-24 hrs</a:t>
                       </a:r>
                     </a:p>
@@ -5364,18 +5355,23 @@
                         <a:buNone/>
                       </a:pPr>
                       <a:r>
-                        <a:rPr lang="nb-NO" sz="1200" dirty="0" smtClean="0"/>
+                        <a:rPr lang="nb-NO" sz="1200" dirty="0"/>
                         <a:t>Convoys</a:t>
                       </a:r>
                       <a:r>
-                        <a:rPr lang="nb-NO" sz="1200" baseline="0" dirty="0" smtClean="0"/>
+                        <a:rPr lang="nb-NO" sz="1200" baseline="0" dirty="0"/>
                         <a:t> of regiment-level supply</a:t>
                       </a:r>
-                      <a:endParaRPr lang="nb-NO" sz="1200" dirty="0" smtClean="0"/>
+                      <a:endParaRPr lang="nb-NO" sz="1200" dirty="0"/>
                     </a:p>
                   </a:txBody>
                   <a:tcPr anchor="ctr"/>
                 </a:tc>
+                <a:extLst>
+                  <a:ext uri="{0D108BD9-81ED-4DB2-BD59-A6C34878D82A}">
+                    <a16:rowId xmlns:a16="http://schemas.microsoft.com/office/drawing/2014/main" val="10007"/>
+                  </a:ext>
+                </a:extLst>
               </a:tr>
               <a:tr h="370840">
                 <a:tc>
@@ -5401,14 +5397,14 @@
                         <a:defRPr/>
                       </a:pPr>
                       <a:r>
-                        <a:rPr lang="nb-NO" sz="1200" dirty="0" smtClean="0"/>
+                        <a:rPr lang="nb-NO" sz="1200" dirty="0"/>
                         <a:t>Setting</a:t>
                       </a:r>
                       <a:r>
-                        <a:rPr lang="nb-NO" sz="1200" baseline="0" dirty="0" smtClean="0"/>
+                        <a:rPr lang="nb-NO" sz="1200" baseline="0" dirty="0"/>
                         <a:t> up for offensive </a:t>
                       </a:r>
-                      <a:endParaRPr lang="nb-NO" sz="1200" dirty="0" smtClean="0"/>
+                      <a:endParaRPr lang="nb-NO" sz="1200" dirty="0"/>
                     </a:p>
                   </a:txBody>
                   <a:tcPr anchor="ctr"/>
@@ -5423,18 +5419,23 @@
                         <a:buNone/>
                       </a:pPr>
                       <a:r>
-                        <a:rPr lang="nb-NO" sz="1200" dirty="0" smtClean="0"/>
+                        <a:rPr lang="nb-NO" sz="1200" dirty="0"/>
                         <a:t>Manuevering</a:t>
                       </a:r>
                       <a:r>
-                        <a:rPr lang="nb-NO" sz="1200" baseline="0" dirty="0" smtClean="0"/>
+                        <a:rPr lang="nb-NO" sz="1200" baseline="0" dirty="0"/>
                         <a:t> units assuming assault formations</a:t>
                       </a:r>
-                      <a:endParaRPr lang="nb-NO" sz="1200" dirty="0" smtClean="0"/>
+                      <a:endParaRPr lang="nb-NO" sz="1200" dirty="0"/>
                     </a:p>
                   </a:txBody>
                   <a:tcPr anchor="ctr"/>
                 </a:tc>
+                <a:extLst>
+                  <a:ext uri="{0D108BD9-81ED-4DB2-BD59-A6C34878D82A}">
+                    <a16:rowId xmlns:a16="http://schemas.microsoft.com/office/drawing/2014/main" val="10008"/>
+                  </a:ext>
+                </a:extLst>
               </a:tr>
               <a:tr h="370840">
                 <a:tc>
@@ -5460,14 +5461,14 @@
                         <a:defRPr/>
                       </a:pPr>
                       <a:r>
-                        <a:rPr lang="nb-NO" sz="1200" dirty="0" smtClean="0"/>
+                        <a:rPr lang="nb-NO" sz="1200" dirty="0"/>
                         <a:t>Division</a:t>
                       </a:r>
                       <a:r>
-                        <a:rPr lang="nb-NO" sz="1200" baseline="0" dirty="0" smtClean="0"/>
+                        <a:rPr lang="nb-NO" sz="1200" baseline="0" dirty="0"/>
                         <a:t> is resupplying in preparation for further missions (Duration up to 72 hrs)</a:t>
                       </a:r>
-                      <a:endParaRPr lang="nb-NO" sz="1200" dirty="0" smtClean="0"/>
+                      <a:endParaRPr lang="nb-NO" sz="1200" dirty="0"/>
                     </a:p>
                   </a:txBody>
                   <a:tcPr anchor="ctr"/>
@@ -5482,7 +5483,7 @@
                         <a:buNone/>
                       </a:pPr>
                       <a:r>
-                        <a:rPr lang="nb-NO" sz="1200" dirty="0" smtClean="0"/>
+                        <a:rPr lang="nb-NO" sz="1200" dirty="0"/>
                         <a:t>* Combat vehicles arranged in non-combat formations (lines/raws, tight together)</a:t>
                       </a:r>
                     </a:p>
@@ -5492,13 +5493,18 @@
                         <a:buNone/>
                       </a:pPr>
                       <a:r>
-                        <a:rPr lang="nb-NO" sz="1200" dirty="0" smtClean="0"/>
+                        <a:rPr lang="nb-NO" sz="1200" dirty="0"/>
                         <a:t>* Supply trucks in close vicinity</a:t>
                       </a:r>
                     </a:p>
                   </a:txBody>
                   <a:tcPr anchor="ctr"/>
                 </a:tc>
+                <a:extLst>
+                  <a:ext uri="{0D108BD9-81ED-4DB2-BD59-A6C34878D82A}">
+                    <a16:rowId xmlns:a16="http://schemas.microsoft.com/office/drawing/2014/main" val="10009"/>
+                  </a:ext>
+                </a:extLst>
               </a:tr>
             </a:tbl>
           </a:graphicData>
@@ -5509,13 +5515,6 @@
   <p:clrMapOvr>
     <a:masterClrMapping/>
   </p:clrMapOvr>
-  <p:timing>
-    <p:tnLst>
-      <p:par>
-        <p:cTn id="1" dur="indefinite" restart="never" nodeType="tmRoot"/>
-      </p:par>
-    </p:tnLst>
-  </p:timing>
 </p:sld>
 </file>
 
@@ -5552,10 +5551,9 @@
           <a:lstStyle/>
           <a:p>
             <a:r>
-              <a:rPr lang="en-US" dirty="0" smtClean="0"/>
+              <a:rPr lang="en-US" dirty="0"/>
               <a:t>INTELLIGENCE GAPS</a:t>
             </a:r>
-            <a:endParaRPr lang="en-US" dirty="0"/>
           </a:p>
         </p:txBody>
       </p:sp>
@@ -5607,10 +5605,9 @@
           <a:p>
             <a:pPr algn="ctr"/>
             <a:r>
-              <a:rPr lang="nb-NO" dirty="0" smtClean="0"/>
+              <a:rPr lang="nb-NO" dirty="0"/>
               <a:t>INSERT MAP HERE</a:t>
             </a:r>
-            <a:endParaRPr lang="nb-NO" dirty="0"/>
           </a:p>
         </p:txBody>
       </p:sp>
@@ -5704,10 +5701,9 @@
           <a:p>
             <a:pPr algn="ctr"/>
             <a:r>
-              <a:rPr lang="nb-NO" sz="1200" dirty="0" smtClean="0"/>
+              <a:rPr lang="nb-NO" sz="1200" dirty="0"/>
               <a:t>A</a:t>
             </a:r>
-            <a:endParaRPr lang="nb-NO" sz="1200" dirty="0"/>
           </a:p>
         </p:txBody>
       </p:sp>
@@ -5756,10 +5752,9 @@
           <a:p>
             <a:pPr algn="ctr"/>
             <a:r>
-              <a:rPr lang="nb-NO" sz="1200" dirty="0" smtClean="0"/>
+              <a:rPr lang="nb-NO" sz="1200" dirty="0"/>
               <a:t>A</a:t>
             </a:r>
-            <a:endParaRPr lang="nb-NO" sz="1200" dirty="0"/>
           </a:p>
         </p:txBody>
       </p:sp>
@@ -5808,10 +5803,9 @@
           <a:p>
             <a:pPr algn="ctr"/>
             <a:r>
-              <a:rPr lang="nb-NO" sz="1200" dirty="0" smtClean="0"/>
+              <a:rPr lang="nb-NO" sz="1200" dirty="0"/>
               <a:t>B</a:t>
             </a:r>
-            <a:endParaRPr lang="nb-NO" sz="1200" dirty="0"/>
           </a:p>
         </p:txBody>
       </p:sp>
@@ -5860,10 +5854,9 @@
           <a:p>
             <a:pPr algn="ctr"/>
             <a:r>
-              <a:rPr lang="nb-NO" sz="1200" dirty="0" smtClean="0"/>
+              <a:rPr lang="nb-NO" sz="1200" dirty="0"/>
               <a:t>B</a:t>
             </a:r>
-            <a:endParaRPr lang="nb-NO" sz="1200" dirty="0"/>
           </a:p>
         </p:txBody>
       </p:sp>
@@ -5912,10 +5905,9 @@
           <a:p>
             <a:pPr algn="ctr"/>
             <a:r>
-              <a:rPr lang="nb-NO" sz="1200" dirty="0" smtClean="0"/>
+              <a:rPr lang="nb-NO" sz="1200" dirty="0"/>
               <a:t>C</a:t>
             </a:r>
-            <a:endParaRPr lang="nb-NO" sz="1200" dirty="0"/>
           </a:p>
         </p:txBody>
       </p:sp>
@@ -5964,10 +5956,9 @@
           <a:p>
             <a:pPr algn="ctr"/>
             <a:r>
-              <a:rPr lang="nb-NO" sz="1200" dirty="0" smtClean="0"/>
+              <a:rPr lang="nb-NO" sz="1200" dirty="0"/>
               <a:t>C</a:t>
             </a:r>
-            <a:endParaRPr lang="nb-NO" sz="1200" dirty="0"/>
           </a:p>
         </p:txBody>
       </p:sp>
@@ -6016,10 +6007,9 @@
           <a:p>
             <a:pPr algn="ctr"/>
             <a:r>
-              <a:rPr lang="nb-NO" sz="1200" dirty="0" smtClean="0"/>
+              <a:rPr lang="nb-NO" sz="1200" dirty="0"/>
               <a:t>D</a:t>
             </a:r>
-            <a:endParaRPr lang="nb-NO" sz="1200" dirty="0"/>
           </a:p>
         </p:txBody>
       </p:sp>
@@ -6068,10 +6058,9 @@
           <a:p>
             <a:pPr algn="ctr"/>
             <a:r>
-              <a:rPr lang="nb-NO" sz="1200" dirty="0" smtClean="0"/>
+              <a:rPr lang="nb-NO" sz="1200" dirty="0"/>
               <a:t>D</a:t>
             </a:r>
-            <a:endParaRPr lang="nb-NO" sz="1200" dirty="0"/>
           </a:p>
         </p:txBody>
       </p:sp>
@@ -6120,10 +6109,9 @@
           <a:p>
             <a:pPr algn="ctr"/>
             <a:r>
-              <a:rPr lang="nb-NO" sz="1200" dirty="0" smtClean="0"/>
+              <a:rPr lang="nb-NO" sz="1200" dirty="0"/>
               <a:t>E</a:t>
             </a:r>
-            <a:endParaRPr lang="nb-NO" sz="1200" dirty="0"/>
           </a:p>
         </p:txBody>
       </p:sp>
@@ -6172,10 +6160,9 @@
           <a:p>
             <a:pPr algn="ctr"/>
             <a:r>
-              <a:rPr lang="nb-NO" sz="1200" dirty="0" smtClean="0"/>
+              <a:rPr lang="nb-NO" sz="1200" dirty="0"/>
               <a:t>E</a:t>
             </a:r>
-            <a:endParaRPr lang="nb-NO" sz="1200" dirty="0"/>
           </a:p>
         </p:txBody>
       </p:sp>
@@ -6224,10 +6211,9 @@
           <a:p>
             <a:pPr algn="ctr"/>
             <a:r>
-              <a:rPr lang="nb-NO" sz="1200" dirty="0" smtClean="0"/>
+              <a:rPr lang="nb-NO" sz="1200" dirty="0"/>
               <a:t>F</a:t>
             </a:r>
-            <a:endParaRPr lang="nb-NO" sz="1200" dirty="0"/>
           </a:p>
         </p:txBody>
       </p:sp>
@@ -6276,10 +6262,9 @@
           <a:p>
             <a:pPr algn="ctr"/>
             <a:r>
-              <a:rPr lang="nb-NO" sz="1200" dirty="0" smtClean="0"/>
+              <a:rPr lang="nb-NO" sz="1200" dirty="0"/>
               <a:t>F</a:t>
             </a:r>
-            <a:endParaRPr lang="nb-NO" sz="1200" dirty="0"/>
           </a:p>
         </p:txBody>
       </p:sp>
@@ -6289,13 +6274,489 @@
     <a:masterClrMapping/>
   </p:clrMapOvr>
   <p:transition/>
-  <p:timing>
-    <p:tnLst>
-      <p:par>
-        <p:cTn id="1" dur="indefinite" restart="never" nodeType="tmRoot"/>
-      </p:par>
-    </p:tnLst>
-  </p:timing>
+</p:sld>
+</file>
+
+<file path=ppt/slides/slide12.xml><?xml version="1.0" encoding="utf-8"?>
+<p:sld xmlns:a="http://schemas.openxmlformats.org/drawingml/2006/main" xmlns:r="http://schemas.openxmlformats.org/officeDocument/2006/relationships" xmlns:p="http://schemas.openxmlformats.org/presentationml/2006/main">
+  <p:cSld>
+    <p:spTree>
+      <p:nvGrpSpPr>
+        <p:cNvPr id="1" name=""/>
+        <p:cNvGrpSpPr/>
+        <p:nvPr/>
+      </p:nvGrpSpPr>
+      <p:grpSpPr>
+        <a:xfrm>
+          <a:off x="0" y="0"/>
+          <a:ext cx="0" cy="0"/>
+          <a:chOff x="0" y="0"/>
+          <a:chExt cx="0" cy="0"/>
+        </a:xfrm>
+      </p:grpSpPr>
+      <p:sp>
+        <p:nvSpPr>
+          <p:cNvPr id="2" name="Tittel 1">
+            <a:extLst>
+              <a:ext uri="{FF2B5EF4-FFF2-40B4-BE49-F238E27FC236}">
+                <a16:creationId xmlns:a16="http://schemas.microsoft.com/office/drawing/2014/main" id="{82C3DB40-AD8A-4EAE-B71F-603F0BE2490F}"/>
+              </a:ext>
+            </a:extLst>
+          </p:cNvPr>
+          <p:cNvSpPr>
+            <a:spLocks noGrp="1"/>
+          </p:cNvSpPr>
+          <p:nvPr>
+            <p:ph type="title"/>
+          </p:nvPr>
+        </p:nvSpPr>
+        <p:spPr/>
+        <p:txBody>
+          <a:bodyPr/>
+          <a:lstStyle/>
+          <a:p>
+            <a:r>
+              <a:rPr lang="en-US" dirty="0"/>
+              <a:t>March</a:t>
+            </a:r>
+          </a:p>
+        </p:txBody>
+      </p:sp>
+      <p:sp>
+        <p:nvSpPr>
+          <p:cNvPr id="3" name="TekstSylinder 2">
+            <a:extLst>
+              <a:ext uri="{FF2B5EF4-FFF2-40B4-BE49-F238E27FC236}">
+                <a16:creationId xmlns:a16="http://schemas.microsoft.com/office/drawing/2014/main" id="{C1F2D31E-D705-42D8-AAA2-091978AFAB91}"/>
+              </a:ext>
+            </a:extLst>
+          </p:cNvPr>
+          <p:cNvSpPr txBox="1"/>
+          <p:nvPr/>
+        </p:nvSpPr>
+        <p:spPr>
+          <a:xfrm>
+            <a:off x="1619672" y="2139702"/>
+            <a:ext cx="3384376" cy="1477328"/>
+          </a:xfrm>
+          <a:prstGeom prst="rect">
+            <a:avLst/>
+          </a:prstGeom>
+          <a:noFill/>
+        </p:spPr>
+        <p:txBody>
+          <a:bodyPr wrap="square" rtlCol="0">
+            <a:spAutoFit/>
+          </a:bodyPr>
+          <a:lstStyle/>
+          <a:p>
+            <a:r>
+              <a:rPr lang="en-US" dirty="0"/>
+              <a:t>Distances </a:t>
+            </a:r>
+          </a:p>
+          <a:p>
+            <a:r>
+              <a:rPr lang="en-US" dirty="0"/>
+              <a:t>Roads</a:t>
+            </a:r>
+          </a:p>
+          <a:p>
+            <a:r>
+              <a:rPr lang="en-US" dirty="0"/>
+              <a:t>Terrain</a:t>
+            </a:r>
+          </a:p>
+          <a:p>
+            <a:r>
+              <a:rPr lang="en-US" dirty="0"/>
+              <a:t>Speed</a:t>
+            </a:r>
+          </a:p>
+          <a:p>
+            <a:r>
+              <a:rPr lang="en-US" dirty="0"/>
+              <a:t>Formation sizes</a:t>
+            </a:r>
+          </a:p>
+        </p:txBody>
+      </p:sp>
+    </p:spTree>
+    <p:extLst>
+      <p:ext uri="{BB962C8B-B14F-4D97-AF65-F5344CB8AC3E}">
+        <p14:creationId xmlns:p14="http://schemas.microsoft.com/office/powerpoint/2010/main" val="2548648399"/>
+      </p:ext>
+    </p:extLst>
+  </p:cSld>
+  <p:clrMapOvr>
+    <a:masterClrMapping/>
+  </p:clrMapOvr>
+</p:sld>
+</file>
+
+<file path=ppt/slides/slide13.xml><?xml version="1.0" encoding="utf-8"?>
+<p:sld xmlns:a="http://schemas.openxmlformats.org/drawingml/2006/main" xmlns:r="http://schemas.openxmlformats.org/officeDocument/2006/relationships" xmlns:p="http://schemas.openxmlformats.org/presentationml/2006/main">
+  <p:cSld>
+    <p:spTree>
+      <p:nvGrpSpPr>
+        <p:cNvPr id="1" name=""/>
+        <p:cNvGrpSpPr/>
+        <p:nvPr/>
+      </p:nvGrpSpPr>
+      <p:grpSpPr>
+        <a:xfrm>
+          <a:off x="0" y="0"/>
+          <a:ext cx="0" cy="0"/>
+          <a:chOff x="0" y="0"/>
+          <a:chExt cx="0" cy="0"/>
+        </a:xfrm>
+      </p:grpSpPr>
+      <p:sp>
+        <p:nvSpPr>
+          <p:cNvPr id="2" name="Tittel 1">
+            <a:extLst>
+              <a:ext uri="{FF2B5EF4-FFF2-40B4-BE49-F238E27FC236}">
+                <a16:creationId xmlns:a16="http://schemas.microsoft.com/office/drawing/2014/main" id="{82C3DB40-AD8A-4EAE-B71F-603F0BE2490F}"/>
+              </a:ext>
+            </a:extLst>
+          </p:cNvPr>
+          <p:cNvSpPr>
+            <a:spLocks noGrp="1"/>
+          </p:cNvSpPr>
+          <p:nvPr>
+            <p:ph type="title"/>
+          </p:nvPr>
+        </p:nvSpPr>
+        <p:spPr/>
+        <p:txBody>
+          <a:bodyPr/>
+          <a:lstStyle/>
+          <a:p>
+            <a:r>
+              <a:rPr lang="en-US" dirty="0"/>
+              <a:t>Combat movement offensive</a:t>
+            </a:r>
+          </a:p>
+        </p:txBody>
+      </p:sp>
+      <p:sp>
+        <p:nvSpPr>
+          <p:cNvPr id="3" name="TekstSylinder 2">
+            <a:extLst>
+              <a:ext uri="{FF2B5EF4-FFF2-40B4-BE49-F238E27FC236}">
+                <a16:creationId xmlns:a16="http://schemas.microsoft.com/office/drawing/2014/main" id="{C1F2D31E-D705-42D8-AAA2-091978AFAB91}"/>
+              </a:ext>
+            </a:extLst>
+          </p:cNvPr>
+          <p:cNvSpPr txBox="1"/>
+          <p:nvPr/>
+        </p:nvSpPr>
+        <p:spPr>
+          <a:xfrm>
+            <a:off x="1619672" y="2139702"/>
+            <a:ext cx="3384376" cy="2585323"/>
+          </a:xfrm>
+          <a:prstGeom prst="rect">
+            <a:avLst/>
+          </a:prstGeom>
+          <a:noFill/>
+        </p:spPr>
+        <p:txBody>
+          <a:bodyPr wrap="square" rtlCol="0">
+            <a:spAutoFit/>
+          </a:bodyPr>
+          <a:lstStyle/>
+          <a:p>
+            <a:r>
+              <a:rPr lang="en-US" dirty="0"/>
+              <a:t>Platoon – distances between vehicles</a:t>
+            </a:r>
+          </a:p>
+          <a:p>
+            <a:endParaRPr lang="en-US" dirty="0"/>
+          </a:p>
+          <a:p>
+            <a:r>
+              <a:rPr lang="en-US" dirty="0"/>
+              <a:t>Company  -distance between company</a:t>
+            </a:r>
+          </a:p>
+          <a:p>
+            <a:endParaRPr lang="en-US" dirty="0"/>
+          </a:p>
+          <a:p>
+            <a:endParaRPr lang="en-US" dirty="0"/>
+          </a:p>
+          <a:p>
+            <a:r>
+              <a:rPr lang="en-US" dirty="0"/>
+              <a:t>BN -  distance between other BN and artillery</a:t>
+            </a:r>
+          </a:p>
+        </p:txBody>
+      </p:sp>
+    </p:spTree>
+    <p:extLst>
+      <p:ext uri="{BB962C8B-B14F-4D97-AF65-F5344CB8AC3E}">
+        <p14:creationId xmlns:p14="http://schemas.microsoft.com/office/powerpoint/2010/main" val="431210920"/>
+      </p:ext>
+    </p:extLst>
+  </p:cSld>
+  <p:clrMapOvr>
+    <a:masterClrMapping/>
+  </p:clrMapOvr>
+</p:sld>
+</file>
+
+<file path=ppt/slides/slide14.xml><?xml version="1.0" encoding="utf-8"?>
+<p:sld xmlns:a="http://schemas.openxmlformats.org/drawingml/2006/main" xmlns:r="http://schemas.openxmlformats.org/officeDocument/2006/relationships" xmlns:p="http://schemas.openxmlformats.org/presentationml/2006/main">
+  <p:cSld>
+    <p:spTree>
+      <p:nvGrpSpPr>
+        <p:cNvPr id="1" name=""/>
+        <p:cNvGrpSpPr/>
+        <p:nvPr/>
+      </p:nvGrpSpPr>
+      <p:grpSpPr>
+        <a:xfrm>
+          <a:off x="0" y="0"/>
+          <a:ext cx="0" cy="0"/>
+          <a:chOff x="0" y="0"/>
+          <a:chExt cx="0" cy="0"/>
+        </a:xfrm>
+      </p:grpSpPr>
+      <p:sp>
+        <p:nvSpPr>
+          <p:cNvPr id="2" name="Tittel 1">
+            <a:extLst>
+              <a:ext uri="{FF2B5EF4-FFF2-40B4-BE49-F238E27FC236}">
+                <a16:creationId xmlns:a16="http://schemas.microsoft.com/office/drawing/2014/main" id="{82C3DB40-AD8A-4EAE-B71F-603F0BE2490F}"/>
+              </a:ext>
+            </a:extLst>
+          </p:cNvPr>
+          <p:cNvSpPr>
+            <a:spLocks noGrp="1"/>
+          </p:cNvSpPr>
+          <p:nvPr>
+            <p:ph type="title"/>
+          </p:nvPr>
+        </p:nvSpPr>
+        <p:spPr/>
+        <p:txBody>
+          <a:bodyPr/>
+          <a:lstStyle/>
+          <a:p>
+            <a:r>
+              <a:rPr lang="en-US" dirty="0"/>
+              <a:t>Defensive disposition</a:t>
+            </a:r>
+          </a:p>
+        </p:txBody>
+      </p:sp>
+      <p:sp>
+        <p:nvSpPr>
+          <p:cNvPr id="3" name="TekstSylinder 2">
+            <a:extLst>
+              <a:ext uri="{FF2B5EF4-FFF2-40B4-BE49-F238E27FC236}">
+                <a16:creationId xmlns:a16="http://schemas.microsoft.com/office/drawing/2014/main" id="{C1F2D31E-D705-42D8-AAA2-091978AFAB91}"/>
+              </a:ext>
+            </a:extLst>
+          </p:cNvPr>
+          <p:cNvSpPr txBox="1"/>
+          <p:nvPr/>
+        </p:nvSpPr>
+        <p:spPr>
+          <a:xfrm>
+            <a:off x="1619672" y="2139702"/>
+            <a:ext cx="3384376" cy="2585323"/>
+          </a:xfrm>
+          <a:prstGeom prst="rect">
+            <a:avLst/>
+          </a:prstGeom>
+          <a:noFill/>
+        </p:spPr>
+        <p:txBody>
+          <a:bodyPr wrap="square" rtlCol="0">
+            <a:spAutoFit/>
+          </a:bodyPr>
+          <a:lstStyle/>
+          <a:p>
+            <a:r>
+              <a:rPr lang="en-US" dirty="0"/>
+              <a:t>Platoon – distances between vehicles</a:t>
+            </a:r>
+          </a:p>
+          <a:p>
+            <a:endParaRPr lang="en-US" dirty="0"/>
+          </a:p>
+          <a:p>
+            <a:r>
+              <a:rPr lang="en-US" dirty="0"/>
+              <a:t>Company  -distance between company</a:t>
+            </a:r>
+          </a:p>
+          <a:p>
+            <a:endParaRPr lang="en-US" dirty="0"/>
+          </a:p>
+          <a:p>
+            <a:endParaRPr lang="en-US" dirty="0"/>
+          </a:p>
+          <a:p>
+            <a:r>
+              <a:rPr lang="en-US" dirty="0"/>
+              <a:t>BN -  distance between other BN and artillery</a:t>
+            </a:r>
+          </a:p>
+        </p:txBody>
+      </p:sp>
+    </p:spTree>
+    <p:extLst>
+      <p:ext uri="{BB962C8B-B14F-4D97-AF65-F5344CB8AC3E}">
+        <p14:creationId xmlns:p14="http://schemas.microsoft.com/office/powerpoint/2010/main" val="2686895182"/>
+      </p:ext>
+    </p:extLst>
+  </p:cSld>
+  <p:clrMapOvr>
+    <a:masterClrMapping/>
+  </p:clrMapOvr>
+</p:sld>
+</file>
+
+<file path=ppt/slides/slide15.xml><?xml version="1.0" encoding="utf-8"?>
+<p:sld xmlns:a="http://schemas.openxmlformats.org/drawingml/2006/main" xmlns:r="http://schemas.openxmlformats.org/officeDocument/2006/relationships" xmlns:p="http://schemas.openxmlformats.org/presentationml/2006/main">
+  <p:cSld>
+    <p:spTree>
+      <p:nvGrpSpPr>
+        <p:cNvPr id="1" name=""/>
+        <p:cNvGrpSpPr/>
+        <p:nvPr/>
+      </p:nvGrpSpPr>
+      <p:grpSpPr>
+        <a:xfrm>
+          <a:off x="0" y="0"/>
+          <a:ext cx="0" cy="0"/>
+          <a:chOff x="0" y="0"/>
+          <a:chExt cx="0" cy="0"/>
+        </a:xfrm>
+      </p:grpSpPr>
+      <p:sp>
+        <p:nvSpPr>
+          <p:cNvPr id="2" name="Tittel 1">
+            <a:extLst>
+              <a:ext uri="{FF2B5EF4-FFF2-40B4-BE49-F238E27FC236}">
+                <a16:creationId xmlns:a16="http://schemas.microsoft.com/office/drawing/2014/main" id="{4A48007C-00A6-4108-8C57-9DA36E26FE29}"/>
+              </a:ext>
+            </a:extLst>
+          </p:cNvPr>
+          <p:cNvSpPr>
+            <a:spLocks noGrp="1"/>
+          </p:cNvSpPr>
+          <p:nvPr>
+            <p:ph type="title"/>
+          </p:nvPr>
+        </p:nvSpPr>
+        <p:spPr/>
+        <p:txBody>
+          <a:bodyPr/>
+          <a:lstStyle/>
+          <a:p>
+            <a:r>
+              <a:rPr lang="en-US" dirty="0"/>
+              <a:t>Artillery support</a:t>
+            </a:r>
+          </a:p>
+        </p:txBody>
+      </p:sp>
+      <p:sp>
+        <p:nvSpPr>
+          <p:cNvPr id="3" name="TekstSylinder 2">
+            <a:extLst>
+              <a:ext uri="{FF2B5EF4-FFF2-40B4-BE49-F238E27FC236}">
+                <a16:creationId xmlns:a16="http://schemas.microsoft.com/office/drawing/2014/main" id="{A3A71D47-87EC-494D-9F7D-2A46746C317E}"/>
+              </a:ext>
+            </a:extLst>
+          </p:cNvPr>
+          <p:cNvSpPr txBox="1"/>
+          <p:nvPr/>
+        </p:nvSpPr>
+        <p:spPr>
+          <a:xfrm>
+            <a:off x="899592" y="1140589"/>
+            <a:ext cx="3096344" cy="2862322"/>
+          </a:xfrm>
+          <a:prstGeom prst="rect">
+            <a:avLst/>
+          </a:prstGeom>
+          <a:noFill/>
+        </p:spPr>
+        <p:txBody>
+          <a:bodyPr wrap="square" rtlCol="0">
+            <a:spAutoFit/>
+          </a:bodyPr>
+          <a:lstStyle/>
+          <a:p>
+            <a:r>
+              <a:rPr lang="en-US" dirty="0"/>
+              <a:t>Arty in shaping (suppression)</a:t>
+            </a:r>
+          </a:p>
+          <a:p>
+            <a:r>
+              <a:rPr lang="en-US" dirty="0"/>
+              <a:t>Point targets</a:t>
+            </a:r>
+          </a:p>
+          <a:p>
+            <a:r>
+              <a:rPr lang="en-US" dirty="0"/>
+              <a:t>Timeline</a:t>
+            </a:r>
+          </a:p>
+          <a:p>
+            <a:endParaRPr lang="en-US" dirty="0"/>
+          </a:p>
+          <a:p>
+            <a:r>
+              <a:rPr lang="en-US" dirty="0"/>
+              <a:t>Normal artillery</a:t>
+            </a:r>
+          </a:p>
+          <a:p>
+            <a:r>
+              <a:rPr lang="en-US" dirty="0"/>
+              <a:t>Rocket artillery</a:t>
+            </a:r>
+          </a:p>
+          <a:p>
+            <a:endParaRPr lang="en-US" dirty="0"/>
+          </a:p>
+          <a:p>
+            <a:r>
+              <a:rPr lang="en-US" dirty="0"/>
+              <a:t>Offensive and defensive</a:t>
+            </a:r>
+          </a:p>
+          <a:p>
+            <a:endParaRPr lang="en-US" dirty="0"/>
+          </a:p>
+          <a:p>
+            <a:r>
+              <a:rPr lang="en-US" dirty="0"/>
+              <a:t>(Will aid JTACs)</a:t>
+            </a:r>
+          </a:p>
+        </p:txBody>
+      </p:sp>
+    </p:spTree>
+    <p:extLst>
+      <p:ext uri="{BB962C8B-B14F-4D97-AF65-F5344CB8AC3E}">
+        <p14:creationId xmlns:p14="http://schemas.microsoft.com/office/powerpoint/2010/main" val="251277543"/>
+      </p:ext>
+    </p:extLst>
+  </p:cSld>
+  <p:clrMapOvr>
+    <a:masterClrMapping/>
+  </p:clrMapOvr>
 </p:sld>
 </file>
 
@@ -6332,10 +6793,9 @@
           <a:lstStyle/>
           <a:p>
             <a:r>
-              <a:rPr lang="en-US" dirty="0" smtClean="0"/>
+              <a:rPr lang="en-US" dirty="0"/>
               <a:t>INTRODUCTION</a:t>
             </a:r>
-            <a:endParaRPr lang="en-US" dirty="0"/>
           </a:p>
         </p:txBody>
       </p:sp>
@@ -6384,10 +6844,9 @@
           <a:p>
             <a:pPr algn="ctr"/>
             <a:r>
-              <a:rPr lang="nb-NO" sz="1200" dirty="0" smtClean="0"/>
+              <a:rPr lang="nb-NO" sz="1200" dirty="0"/>
               <a:t>A</a:t>
             </a:r>
-            <a:endParaRPr lang="nb-NO" sz="1200" dirty="0"/>
           </a:p>
         </p:txBody>
       </p:sp>
@@ -6436,10 +6895,9 @@
           <a:p>
             <a:pPr algn="ctr"/>
             <a:r>
-              <a:rPr lang="nb-NO" sz="1200" dirty="0" smtClean="0"/>
+              <a:rPr lang="nb-NO" sz="1200" dirty="0"/>
               <a:t>A</a:t>
             </a:r>
-            <a:endParaRPr lang="nb-NO" sz="1200" dirty="0"/>
           </a:p>
         </p:txBody>
       </p:sp>
@@ -6488,10 +6946,9 @@
           <a:p>
             <a:pPr algn="ctr"/>
             <a:r>
-              <a:rPr lang="nb-NO" sz="1200" dirty="0" smtClean="0"/>
+              <a:rPr lang="nb-NO" sz="1200" dirty="0"/>
               <a:t>B</a:t>
             </a:r>
-            <a:endParaRPr lang="nb-NO" sz="1200" dirty="0"/>
           </a:p>
         </p:txBody>
       </p:sp>
@@ -6540,10 +6997,9 @@
           <a:p>
             <a:pPr algn="ctr"/>
             <a:r>
-              <a:rPr lang="nb-NO" sz="1200" dirty="0" smtClean="0"/>
+              <a:rPr lang="nb-NO" sz="1200" dirty="0"/>
               <a:t>B</a:t>
             </a:r>
-            <a:endParaRPr lang="nb-NO" sz="1200" dirty="0"/>
           </a:p>
         </p:txBody>
       </p:sp>
@@ -6592,10 +7048,9 @@
           <a:p>
             <a:pPr algn="ctr"/>
             <a:r>
-              <a:rPr lang="nb-NO" sz="1200" dirty="0" smtClean="0"/>
+              <a:rPr lang="nb-NO" sz="1200" dirty="0"/>
               <a:t>C</a:t>
             </a:r>
-            <a:endParaRPr lang="nb-NO" sz="1200" dirty="0"/>
           </a:p>
         </p:txBody>
       </p:sp>
@@ -6644,10 +7099,9 @@
           <a:p>
             <a:pPr algn="ctr"/>
             <a:r>
-              <a:rPr lang="nb-NO" sz="1200" dirty="0" smtClean="0"/>
+              <a:rPr lang="nb-NO" sz="1200" dirty="0"/>
               <a:t>C</a:t>
             </a:r>
-            <a:endParaRPr lang="nb-NO" sz="1200" dirty="0"/>
           </a:p>
         </p:txBody>
       </p:sp>
@@ -6696,10 +7150,9 @@
           <a:p>
             <a:pPr algn="ctr"/>
             <a:r>
-              <a:rPr lang="nb-NO" sz="1200" dirty="0" smtClean="0"/>
+              <a:rPr lang="nb-NO" sz="1200" dirty="0"/>
               <a:t>D</a:t>
             </a:r>
-            <a:endParaRPr lang="nb-NO" sz="1200" dirty="0"/>
           </a:p>
         </p:txBody>
       </p:sp>
@@ -6748,10 +7201,9 @@
           <a:p>
             <a:pPr algn="ctr"/>
             <a:r>
-              <a:rPr lang="nb-NO" sz="1200" dirty="0" smtClean="0"/>
+              <a:rPr lang="nb-NO" sz="1200" dirty="0"/>
               <a:t>D</a:t>
             </a:r>
-            <a:endParaRPr lang="nb-NO" sz="1200" dirty="0"/>
           </a:p>
         </p:txBody>
       </p:sp>
@@ -6800,10 +7252,9 @@
           <a:p>
             <a:pPr algn="ctr"/>
             <a:r>
-              <a:rPr lang="nb-NO" sz="1200" dirty="0" smtClean="0"/>
+              <a:rPr lang="nb-NO" sz="1200" dirty="0"/>
               <a:t>E</a:t>
             </a:r>
-            <a:endParaRPr lang="nb-NO" sz="1200" dirty="0"/>
           </a:p>
         </p:txBody>
       </p:sp>
@@ -6852,10 +7303,9 @@
           <a:p>
             <a:pPr algn="ctr"/>
             <a:r>
-              <a:rPr lang="nb-NO" sz="1200" dirty="0" smtClean="0"/>
+              <a:rPr lang="nb-NO" sz="1200" dirty="0"/>
               <a:t>E</a:t>
             </a:r>
-            <a:endParaRPr lang="nb-NO" sz="1200" dirty="0"/>
           </a:p>
         </p:txBody>
       </p:sp>
@@ -6904,10 +7354,9 @@
           <a:p>
             <a:pPr algn="ctr"/>
             <a:r>
-              <a:rPr lang="nb-NO" sz="1200" dirty="0" smtClean="0"/>
+              <a:rPr lang="nb-NO" sz="1200" dirty="0"/>
               <a:t>F</a:t>
             </a:r>
-            <a:endParaRPr lang="nb-NO" sz="1200" dirty="0"/>
           </a:p>
         </p:txBody>
       </p:sp>
@@ -6956,10 +7405,9 @@
           <a:p>
             <a:pPr algn="ctr"/>
             <a:r>
-              <a:rPr lang="nb-NO" sz="1200" dirty="0" smtClean="0"/>
+              <a:rPr lang="nb-NO" sz="1200" dirty="0"/>
               <a:t>F</a:t>
             </a:r>
-            <a:endParaRPr lang="nb-NO" sz="1200" dirty="0"/>
           </a:p>
         </p:txBody>
       </p:sp>
@@ -6986,14 +7434,14 @@
           <a:lstStyle/>
           <a:p>
             <a:r>
-              <a:rPr lang="nb-NO" sz="1400" b="1" u="sng" dirty="0" err="1" smtClean="0">
+              <a:rPr lang="nb-NO" sz="1400" b="1" u="sng" dirty="0" err="1">
                 <a:latin typeface="Arial" pitchFamily="34" charset="0"/>
                 <a:cs typeface="Arial" pitchFamily="34" charset="0"/>
               </a:rPr>
               <a:t>Aim</a:t>
             </a:r>
             <a:r>
-              <a:rPr lang="nb-NO" sz="1400" b="1" u="sng" dirty="0" smtClean="0">
+              <a:rPr lang="nb-NO" sz="1400" b="1" u="sng" dirty="0">
                 <a:latin typeface="Arial" pitchFamily="34" charset="0"/>
                 <a:cs typeface="Arial" pitchFamily="34" charset="0"/>
               </a:rPr>
@@ -7002,7 +7450,7 @@
           </a:p>
           <a:p>
             <a:r>
-              <a:rPr lang="nb-NO" sz="1400" dirty="0" smtClean="0">
+              <a:rPr lang="nb-NO" sz="1400" dirty="0">
                 <a:latin typeface="Arial" pitchFamily="34" charset="0"/>
                 <a:cs typeface="Arial" pitchFamily="34" charset="0"/>
               </a:rPr>
@@ -7010,21 +7458,21 @@
             </a:r>
           </a:p>
           <a:p>
-            <a:endParaRPr lang="nb-NO" sz="1400" dirty="0" smtClean="0">
+            <a:endParaRPr lang="nb-NO" sz="1400" dirty="0">
               <a:latin typeface="Arial" pitchFamily="34" charset="0"/>
               <a:cs typeface="Arial" pitchFamily="34" charset="0"/>
             </a:endParaRPr>
           </a:p>
           <a:p>
             <a:r>
-              <a:rPr lang="nb-NO" sz="1400" b="1" u="sng" dirty="0" err="1" smtClean="0">
+              <a:rPr lang="nb-NO" sz="1400" b="1" u="sng" dirty="0" err="1">
                 <a:latin typeface="Arial" pitchFamily="34" charset="0"/>
                 <a:cs typeface="Arial" pitchFamily="34" charset="0"/>
               </a:rPr>
               <a:t>Reference</a:t>
             </a:r>
             <a:r>
-              <a:rPr lang="nb-NO" sz="1400" b="1" u="sng" dirty="0" smtClean="0">
+              <a:rPr lang="nb-NO" sz="1400" b="1" u="sng" dirty="0">
                 <a:latin typeface="Arial" pitchFamily="34" charset="0"/>
                 <a:cs typeface="Arial" pitchFamily="34" charset="0"/>
               </a:rPr>
@@ -7033,11 +7481,11 @@
           </a:p>
           <a:p>
             <a:r>
-              <a:rPr lang="en-US" sz="1400" dirty="0" smtClean="0">
+              <a:rPr lang="en-US" sz="1400" dirty="0">
                 <a:latin typeface="Arial" pitchFamily="34" charset="0"/>
                 <a:cs typeface="Arial" pitchFamily="34" charset="0"/>
               </a:rPr>
-              <a:t>INTREP VIS B-001 Generic Ground Force Structure v1.0</a:t>
+              <a:t>INTREP VID B-001 Generic Ground Force Structure v2.0</a:t>
             </a:r>
             <a:endParaRPr lang="nb-NO" sz="1400" dirty="0">
               <a:latin typeface="Arial" pitchFamily="34" charset="0"/>
@@ -7069,14 +7517,14 @@
           <a:lstStyle/>
           <a:p>
             <a:r>
-              <a:rPr lang="nb-NO" sz="1400" b="1" u="sng" dirty="0" err="1" smtClean="0">
+              <a:rPr lang="nb-NO" sz="1400" b="1" u="sng" dirty="0" err="1">
                 <a:latin typeface="Arial" pitchFamily="34" charset="0"/>
                 <a:cs typeface="Arial" pitchFamily="34" charset="0"/>
               </a:rPr>
               <a:t>Content</a:t>
             </a:r>
             <a:r>
-              <a:rPr lang="nb-NO" sz="1400" b="1" u="sng" dirty="0" smtClean="0">
+              <a:rPr lang="nb-NO" sz="1400" b="1" u="sng" dirty="0">
                 <a:latin typeface="Arial" pitchFamily="34" charset="0"/>
                 <a:cs typeface="Arial" pitchFamily="34" charset="0"/>
               </a:rPr>
@@ -7085,54 +7533,54 @@
           </a:p>
           <a:p>
             <a:r>
-              <a:rPr lang="nb-NO" sz="1400" dirty="0" smtClean="0">
+              <a:rPr lang="nb-NO" sz="1400" dirty="0">
                 <a:latin typeface="Arial" pitchFamily="34" charset="0"/>
                 <a:cs typeface="Arial" pitchFamily="34" charset="0"/>
                 <a:hlinkClick r:id="rId2" action="ppaction://hlinksldjump"/>
               </a:rPr>
               <a:t>Division offensive</a:t>
             </a:r>
-            <a:endParaRPr lang="nb-NO" sz="1400" dirty="0" smtClean="0">
+            <a:endParaRPr lang="nb-NO" sz="1400" dirty="0">
               <a:latin typeface="Arial" pitchFamily="34" charset="0"/>
               <a:cs typeface="Arial" pitchFamily="34" charset="0"/>
             </a:endParaRPr>
           </a:p>
           <a:p>
             <a:r>
-              <a:rPr lang="nb-NO" sz="1400" dirty="0" smtClean="0">
+              <a:rPr lang="nb-NO" sz="1400" dirty="0">
                 <a:latin typeface="Arial" pitchFamily="34" charset="0"/>
                 <a:cs typeface="Arial" pitchFamily="34" charset="0"/>
                 <a:hlinkClick r:id="rId3" action="ppaction://hlinksldjump"/>
               </a:rPr>
               <a:t>Indicators</a:t>
             </a:r>
-            <a:endParaRPr lang="nb-NO" sz="1400" dirty="0" smtClean="0">
+            <a:endParaRPr lang="nb-NO" sz="1400" dirty="0">
               <a:latin typeface="Arial" pitchFamily="34" charset="0"/>
               <a:cs typeface="Arial" pitchFamily="34" charset="0"/>
             </a:endParaRPr>
           </a:p>
           <a:p>
             <a:r>
-              <a:rPr lang="nb-NO" sz="1400" dirty="0" smtClean="0">
+              <a:rPr lang="nb-NO" sz="1400" dirty="0">
                 <a:latin typeface="Arial" pitchFamily="34" charset="0"/>
                 <a:cs typeface="Arial" pitchFamily="34" charset="0"/>
                 <a:hlinkClick r:id="rId4" action="ppaction://hlinksldjump"/>
               </a:rPr>
               <a:t>Intelligence gaps</a:t>
             </a:r>
-            <a:endParaRPr lang="nb-NO" sz="1400" dirty="0" smtClean="0">
+            <a:endParaRPr lang="nb-NO" sz="1400" dirty="0">
               <a:latin typeface="Arial" pitchFamily="34" charset="0"/>
               <a:cs typeface="Arial" pitchFamily="34" charset="0"/>
             </a:endParaRPr>
           </a:p>
           <a:p>
-            <a:endParaRPr lang="nb-NO" sz="1400" dirty="0" smtClean="0">
+            <a:endParaRPr lang="nb-NO" sz="1400" dirty="0">
               <a:latin typeface="Arial" pitchFamily="34" charset="0"/>
               <a:cs typeface="Arial" pitchFamily="34" charset="0"/>
             </a:endParaRPr>
           </a:p>
           <a:p>
-            <a:endParaRPr lang="nb-NO" sz="1400" dirty="0" smtClean="0">
+            <a:endParaRPr lang="nb-NO" sz="1400" dirty="0">
               <a:latin typeface="Arial" pitchFamily="34" charset="0"/>
               <a:cs typeface="Arial" pitchFamily="34" charset="0"/>
             </a:endParaRPr>
@@ -7150,13 +7598,6 @@
   <p:clrMapOvr>
     <a:masterClrMapping/>
   </p:clrMapOvr>
-  <p:timing>
-    <p:tnLst>
-      <p:par>
-        <p:cTn id="1" dur="indefinite" restart="never" nodeType="tmRoot"/>
-      </p:par>
-    </p:tnLst>
-  </p:timing>
 </p:sld>
 </file>
 
@@ -7193,10 +7634,9 @@
           <a:lstStyle/>
           <a:p>
             <a:r>
-              <a:rPr lang="en-US" dirty="0" smtClean="0"/>
+              <a:rPr lang="en-US" dirty="0"/>
               <a:t>DIVISION OFFENSIVE</a:t>
             </a:r>
-            <a:endParaRPr lang="en-US" dirty="0"/>
           </a:p>
         </p:txBody>
       </p:sp>
@@ -7245,16 +7685,12 @@
           <a:p>
             <a:pPr algn="ctr"/>
             <a:r>
-              <a:rPr lang="nb-NO" sz="1050" dirty="0" smtClean="0">
+              <a:rPr lang="nb-NO" sz="1050" dirty="0">
                 <a:latin typeface="Arial" pitchFamily="34" charset="0"/>
                 <a:cs typeface="Arial" pitchFamily="34" charset="0"/>
               </a:rPr>
               <a:t>DIV HQ</a:t>
             </a:r>
-            <a:endParaRPr lang="nb-NO" sz="1050" dirty="0">
-              <a:latin typeface="Arial" pitchFamily="34" charset="0"/>
-              <a:cs typeface="Arial" pitchFamily="34" charset="0"/>
-            </a:endParaRPr>
           </a:p>
         </p:txBody>
       </p:sp>
@@ -7423,16 +7859,12 @@
           <a:p>
             <a:pPr algn="ctr"/>
             <a:r>
-              <a:rPr lang="nb-NO" sz="1050" dirty="0" smtClean="0">
+              <a:rPr lang="nb-NO" sz="1050" dirty="0">
                 <a:latin typeface="Arial" pitchFamily="34" charset="0"/>
                 <a:cs typeface="Arial" pitchFamily="34" charset="0"/>
               </a:rPr>
               <a:t>ROCKETARTY BN</a:t>
             </a:r>
-            <a:endParaRPr lang="nb-NO" sz="1050" dirty="0">
-              <a:latin typeface="Arial" pitchFamily="34" charset="0"/>
-              <a:cs typeface="Arial" pitchFamily="34" charset="0"/>
-            </a:endParaRPr>
           </a:p>
         </p:txBody>
       </p:sp>
@@ -7481,16 +7913,12 @@
           <a:p>
             <a:pPr algn="ctr"/>
             <a:r>
-              <a:rPr lang="nb-NO" sz="1050" dirty="0" smtClean="0">
+              <a:rPr lang="nb-NO" sz="1050" dirty="0">
                 <a:latin typeface="Arial" pitchFamily="34" charset="0"/>
                 <a:cs typeface="Arial" pitchFamily="34" charset="0"/>
               </a:rPr>
               <a:t>LOGISTIC BN</a:t>
             </a:r>
-            <a:endParaRPr lang="nb-NO" sz="1050" dirty="0">
-              <a:latin typeface="Arial" pitchFamily="34" charset="0"/>
-              <a:cs typeface="Arial" pitchFamily="34" charset="0"/>
-            </a:endParaRPr>
           </a:p>
         </p:txBody>
       </p:sp>
@@ -7539,16 +7967,12 @@
           <a:p>
             <a:pPr algn="ctr"/>
             <a:r>
-              <a:rPr lang="nb-NO" sz="1050" dirty="0" smtClean="0">
+              <a:rPr lang="nb-NO" sz="1050" dirty="0">
                 <a:latin typeface="Arial" pitchFamily="34" charset="0"/>
                 <a:cs typeface="Arial" pitchFamily="34" charset="0"/>
               </a:rPr>
               <a:t>SA-8 BN</a:t>
             </a:r>
-            <a:endParaRPr lang="nb-NO" sz="1050" dirty="0">
-              <a:latin typeface="Arial" pitchFamily="34" charset="0"/>
-              <a:cs typeface="Arial" pitchFamily="34" charset="0"/>
-            </a:endParaRPr>
           </a:p>
         </p:txBody>
       </p:sp>
@@ -7597,16 +8021,12 @@
           <a:p>
             <a:pPr algn="ctr"/>
             <a:r>
-              <a:rPr lang="nb-NO" sz="1050" dirty="0" smtClean="0">
+              <a:rPr lang="nb-NO" sz="1050" dirty="0">
                 <a:latin typeface="Arial" pitchFamily="34" charset="0"/>
                 <a:cs typeface="Arial" pitchFamily="34" charset="0"/>
               </a:rPr>
               <a:t>SA-15 BN</a:t>
             </a:r>
-            <a:endParaRPr lang="nb-NO" sz="1050" dirty="0">
-              <a:latin typeface="Arial" pitchFamily="34" charset="0"/>
-              <a:cs typeface="Arial" pitchFamily="34" charset="0"/>
-            </a:endParaRPr>
           </a:p>
         </p:txBody>
       </p:sp>
@@ -7682,16 +8102,12 @@
           <a:p>
             <a:pPr algn="ctr"/>
             <a:r>
-              <a:rPr lang="nb-NO" sz="1100" dirty="0" smtClean="0">
+              <a:rPr lang="nb-NO" sz="1100" dirty="0">
                 <a:latin typeface="Arial" pitchFamily="34" charset="0"/>
                 <a:cs typeface="Arial" pitchFamily="34" charset="0"/>
               </a:rPr>
               <a:t>Front brigade #1</a:t>
             </a:r>
-            <a:endParaRPr lang="nb-NO" sz="1100" dirty="0">
-              <a:latin typeface="Arial" pitchFamily="34" charset="0"/>
-              <a:cs typeface="Arial" pitchFamily="34" charset="0"/>
-            </a:endParaRPr>
           </a:p>
         </p:txBody>
       </p:sp>
@@ -7757,16 +8173,12 @@
           <a:lstStyle/>
           <a:p>
             <a:r>
-              <a:rPr lang="nb-NO" dirty="0" smtClean="0">
+              <a:rPr lang="nb-NO" dirty="0">
                 <a:latin typeface="Arial" pitchFamily="34" charset="0"/>
                 <a:cs typeface="Arial" pitchFamily="34" charset="0"/>
               </a:rPr>
               <a:t>FLOT</a:t>
             </a:r>
-            <a:endParaRPr lang="nb-NO" dirty="0">
-              <a:latin typeface="Arial" pitchFamily="34" charset="0"/>
-              <a:cs typeface="Arial" pitchFamily="34" charset="0"/>
-            </a:endParaRPr>
           </a:p>
         </p:txBody>
       </p:sp>
@@ -7815,16 +8227,12 @@
           <a:p>
             <a:pPr algn="ctr"/>
             <a:r>
-              <a:rPr lang="nb-NO" sz="1050" dirty="0" smtClean="0">
+              <a:rPr lang="nb-NO" sz="1050" dirty="0">
                 <a:latin typeface="Arial" pitchFamily="34" charset="0"/>
                 <a:cs typeface="Arial" pitchFamily="34" charset="0"/>
               </a:rPr>
               <a:t>BN</a:t>
             </a:r>
-            <a:endParaRPr lang="nb-NO" sz="1050" dirty="0">
-              <a:latin typeface="Arial" pitchFamily="34" charset="0"/>
-              <a:cs typeface="Arial" pitchFamily="34" charset="0"/>
-            </a:endParaRPr>
           </a:p>
         </p:txBody>
       </p:sp>
@@ -7873,16 +8281,12 @@
           <a:p>
             <a:pPr algn="ctr"/>
             <a:r>
-              <a:rPr lang="nb-NO" sz="1050" dirty="0" smtClean="0">
+              <a:rPr lang="nb-NO" sz="1050" dirty="0">
                 <a:latin typeface="Arial" pitchFamily="34" charset="0"/>
                 <a:cs typeface="Arial" pitchFamily="34" charset="0"/>
               </a:rPr>
               <a:t>BN</a:t>
             </a:r>
-            <a:endParaRPr lang="nb-NO" sz="1050" dirty="0">
-              <a:latin typeface="Arial" pitchFamily="34" charset="0"/>
-              <a:cs typeface="Arial" pitchFamily="34" charset="0"/>
-            </a:endParaRPr>
           </a:p>
         </p:txBody>
       </p:sp>
@@ -7931,16 +8335,12 @@
           <a:p>
             <a:pPr algn="ctr"/>
             <a:r>
-              <a:rPr lang="nb-NO" sz="1050" dirty="0" smtClean="0">
+              <a:rPr lang="nb-NO" sz="1050" dirty="0">
                 <a:latin typeface="Arial" pitchFamily="34" charset="0"/>
                 <a:cs typeface="Arial" pitchFamily="34" charset="0"/>
               </a:rPr>
               <a:t>BN</a:t>
             </a:r>
-            <a:endParaRPr lang="nb-NO" sz="1050" dirty="0">
-              <a:latin typeface="Arial" pitchFamily="34" charset="0"/>
-              <a:cs typeface="Arial" pitchFamily="34" charset="0"/>
-            </a:endParaRPr>
           </a:p>
         </p:txBody>
       </p:sp>
@@ -8027,16 +8427,12 @@
           <a:p>
             <a:pPr algn="ctr"/>
             <a:r>
-              <a:rPr lang="nb-NO" sz="1100" dirty="0" smtClean="0">
+              <a:rPr lang="nb-NO" sz="1100" dirty="0">
                 <a:latin typeface="Arial" pitchFamily="34" charset="0"/>
                 <a:cs typeface="Arial" pitchFamily="34" charset="0"/>
               </a:rPr>
               <a:t>Front brigade #2</a:t>
             </a:r>
-            <a:endParaRPr lang="nb-NO" sz="1100" dirty="0">
-              <a:latin typeface="Arial" pitchFamily="34" charset="0"/>
-              <a:cs typeface="Arial" pitchFamily="34" charset="0"/>
-            </a:endParaRPr>
           </a:p>
         </p:txBody>
       </p:sp>
@@ -8124,16 +8520,12 @@
           <a:p>
             <a:pPr algn="ctr"/>
             <a:r>
-              <a:rPr lang="nb-NO" sz="1050" dirty="0" smtClean="0">
+              <a:rPr lang="nb-NO" sz="1050" dirty="0">
                 <a:latin typeface="Arial" pitchFamily="34" charset="0"/>
                 <a:cs typeface="Arial" pitchFamily="34" charset="0"/>
               </a:rPr>
               <a:t>BN</a:t>
             </a:r>
-            <a:endParaRPr lang="nb-NO" sz="1050" dirty="0">
-              <a:latin typeface="Arial" pitchFamily="34" charset="0"/>
-              <a:cs typeface="Arial" pitchFamily="34" charset="0"/>
-            </a:endParaRPr>
           </a:p>
         </p:txBody>
       </p:sp>
@@ -8182,16 +8574,12 @@
           <a:p>
             <a:pPr algn="ctr"/>
             <a:r>
-              <a:rPr lang="nb-NO" sz="1050" dirty="0" smtClean="0">
+              <a:rPr lang="nb-NO" sz="1050" dirty="0">
                 <a:latin typeface="Arial" pitchFamily="34" charset="0"/>
                 <a:cs typeface="Arial" pitchFamily="34" charset="0"/>
               </a:rPr>
               <a:t>BN</a:t>
             </a:r>
-            <a:endParaRPr lang="nb-NO" sz="1050" dirty="0">
-              <a:latin typeface="Arial" pitchFamily="34" charset="0"/>
-              <a:cs typeface="Arial" pitchFamily="34" charset="0"/>
-            </a:endParaRPr>
           </a:p>
         </p:txBody>
       </p:sp>
@@ -8240,16 +8628,12 @@
           <a:p>
             <a:pPr algn="ctr"/>
             <a:r>
-              <a:rPr lang="nb-NO" sz="1050" dirty="0" smtClean="0">
+              <a:rPr lang="nb-NO" sz="1050" dirty="0">
                 <a:latin typeface="Arial" pitchFamily="34" charset="0"/>
                 <a:cs typeface="Arial" pitchFamily="34" charset="0"/>
               </a:rPr>
               <a:t>BN</a:t>
             </a:r>
-            <a:endParaRPr lang="nb-NO" sz="1050" dirty="0">
-              <a:latin typeface="Arial" pitchFamily="34" charset="0"/>
-              <a:cs typeface="Arial" pitchFamily="34" charset="0"/>
-            </a:endParaRPr>
           </a:p>
         </p:txBody>
       </p:sp>
@@ -8336,16 +8720,12 @@
           <a:p>
             <a:pPr algn="ctr"/>
             <a:r>
-              <a:rPr lang="nb-NO" sz="1100" dirty="0" smtClean="0">
+              <a:rPr lang="nb-NO" sz="1100" dirty="0">
                 <a:latin typeface="Arial" pitchFamily="34" charset="0"/>
                 <a:cs typeface="Arial" pitchFamily="34" charset="0"/>
               </a:rPr>
               <a:t>Rear brigade</a:t>
             </a:r>
-            <a:endParaRPr lang="nb-NO" sz="1100" dirty="0">
-              <a:latin typeface="Arial" pitchFamily="34" charset="0"/>
-              <a:cs typeface="Arial" pitchFamily="34" charset="0"/>
-            </a:endParaRPr>
           </a:p>
         </p:txBody>
       </p:sp>
@@ -8433,16 +8813,12 @@
           <a:p>
             <a:pPr algn="ctr"/>
             <a:r>
-              <a:rPr lang="nb-NO" sz="1050" dirty="0" smtClean="0">
+              <a:rPr lang="nb-NO" sz="1050" dirty="0">
                 <a:latin typeface="Arial" pitchFamily="34" charset="0"/>
                 <a:cs typeface="Arial" pitchFamily="34" charset="0"/>
               </a:rPr>
               <a:t>BN</a:t>
             </a:r>
-            <a:endParaRPr lang="nb-NO" sz="1050" dirty="0">
-              <a:latin typeface="Arial" pitchFamily="34" charset="0"/>
-              <a:cs typeface="Arial" pitchFamily="34" charset="0"/>
-            </a:endParaRPr>
           </a:p>
         </p:txBody>
       </p:sp>
@@ -8491,16 +8867,12 @@
           <a:p>
             <a:pPr algn="ctr"/>
             <a:r>
-              <a:rPr lang="nb-NO" sz="1050" dirty="0" smtClean="0">
+              <a:rPr lang="nb-NO" sz="1050" dirty="0">
                 <a:latin typeface="Arial" pitchFamily="34" charset="0"/>
                 <a:cs typeface="Arial" pitchFamily="34" charset="0"/>
               </a:rPr>
               <a:t>BN</a:t>
             </a:r>
-            <a:endParaRPr lang="nb-NO" sz="1050" dirty="0">
-              <a:latin typeface="Arial" pitchFamily="34" charset="0"/>
-              <a:cs typeface="Arial" pitchFamily="34" charset="0"/>
-            </a:endParaRPr>
           </a:p>
         </p:txBody>
       </p:sp>
@@ -8549,16 +8921,12 @@
           <a:p>
             <a:pPr algn="ctr"/>
             <a:r>
-              <a:rPr lang="nb-NO" sz="1050" dirty="0" smtClean="0">
+              <a:rPr lang="nb-NO" sz="1050" dirty="0">
                 <a:latin typeface="Arial" pitchFamily="34" charset="0"/>
                 <a:cs typeface="Arial" pitchFamily="34" charset="0"/>
               </a:rPr>
               <a:t>BN</a:t>
             </a:r>
-            <a:endParaRPr lang="nb-NO" sz="1050" dirty="0">
-              <a:latin typeface="Arial" pitchFamily="34" charset="0"/>
-              <a:cs typeface="Arial" pitchFamily="34" charset="0"/>
-            </a:endParaRPr>
           </a:p>
         </p:txBody>
       </p:sp>
@@ -8595,7 +8963,7 @@
           <a:lstStyle/>
           <a:p>
             <a:r>
-              <a:rPr lang="nb-NO" sz="1100" dirty="0" smtClean="0">
+              <a:rPr lang="nb-NO" sz="1100" dirty="0">
                 <a:latin typeface="Arial" pitchFamily="34" charset="0"/>
                 <a:cs typeface="Arial" pitchFamily="34" charset="0"/>
               </a:rPr>
@@ -8610,7 +8978,7 @@
           </a:p>
           <a:p>
             <a:r>
-              <a:rPr lang="nb-NO" sz="1100" dirty="0" smtClean="0">
+              <a:rPr lang="nb-NO" sz="1100" dirty="0">
                 <a:latin typeface="Arial" pitchFamily="34" charset="0"/>
                 <a:cs typeface="Arial" pitchFamily="34" charset="0"/>
               </a:rPr>
@@ -8619,7 +8987,7 @@
           </a:p>
           <a:p>
             <a:r>
-              <a:rPr lang="nb-NO" sz="1100" dirty="0" smtClean="0">
+              <a:rPr lang="nb-NO" sz="1100" dirty="0">
                 <a:latin typeface="Arial" pitchFamily="34" charset="0"/>
                 <a:cs typeface="Arial" pitchFamily="34" charset="0"/>
               </a:rPr>
@@ -8628,7 +8996,7 @@
           </a:p>
           <a:p>
             <a:r>
-              <a:rPr lang="nb-NO" sz="1100" dirty="0" smtClean="0">
+              <a:rPr lang="nb-NO" sz="1100" dirty="0">
                 <a:latin typeface="Arial" pitchFamily="34" charset="0"/>
                 <a:cs typeface="Arial" pitchFamily="34" charset="0"/>
               </a:rPr>
@@ -8637,7 +9005,7 @@
           </a:p>
           <a:p>
             <a:r>
-              <a:rPr lang="nb-NO" sz="1100" dirty="0" smtClean="0">
+              <a:rPr lang="nb-NO" sz="1100" dirty="0">
                 <a:latin typeface="Arial" pitchFamily="34" charset="0"/>
                 <a:cs typeface="Arial" pitchFamily="34" charset="0"/>
               </a:rPr>
@@ -8691,16 +9059,12 @@
           <a:p>
             <a:pPr algn="ctr"/>
             <a:r>
-              <a:rPr lang="nb-NO" sz="800" dirty="0" smtClean="0">
+              <a:rPr lang="nb-NO" sz="800" dirty="0">
                 <a:latin typeface="Arial" pitchFamily="34" charset="0"/>
                 <a:cs typeface="Arial" pitchFamily="34" charset="0"/>
               </a:rPr>
               <a:t>ARTY BN</a:t>
             </a:r>
-            <a:endParaRPr lang="nb-NO" sz="800" dirty="0">
-              <a:latin typeface="Arial" pitchFamily="34" charset="0"/>
-              <a:cs typeface="Arial" pitchFamily="34" charset="0"/>
-            </a:endParaRPr>
           </a:p>
         </p:txBody>
       </p:sp>
@@ -8749,16 +9113,12 @@
           <a:p>
             <a:pPr algn="ctr"/>
             <a:r>
-              <a:rPr lang="nb-NO" sz="800" dirty="0" smtClean="0">
+              <a:rPr lang="nb-NO" sz="800" dirty="0">
                 <a:latin typeface="Arial" pitchFamily="34" charset="0"/>
                 <a:cs typeface="Arial" pitchFamily="34" charset="0"/>
               </a:rPr>
               <a:t>ARTY BN</a:t>
             </a:r>
-            <a:endParaRPr lang="nb-NO" sz="800" dirty="0">
-              <a:latin typeface="Arial" pitchFamily="34" charset="0"/>
-              <a:cs typeface="Arial" pitchFamily="34" charset="0"/>
-            </a:endParaRPr>
           </a:p>
         </p:txBody>
       </p:sp>
@@ -8807,36 +9167,25 @@
           <a:p>
             <a:pPr algn="ctr"/>
             <a:r>
-              <a:rPr lang="nb-NO" sz="800" dirty="0" smtClean="0">
+              <a:rPr lang="nb-NO" sz="800" dirty="0">
                 <a:latin typeface="Arial" pitchFamily="34" charset="0"/>
                 <a:cs typeface="Arial" pitchFamily="34" charset="0"/>
               </a:rPr>
               <a:t>ARTY BN</a:t>
             </a:r>
-            <a:endParaRPr lang="nb-NO" sz="800" dirty="0">
-              <a:latin typeface="Arial" pitchFamily="34" charset="0"/>
-              <a:cs typeface="Arial" pitchFamily="34" charset="0"/>
-            </a:endParaRPr>
           </a:p>
         </p:txBody>
       </p:sp>
     </p:spTree>
     <p:extLst>
       <p:ext uri="{BB962C8B-B14F-4D97-AF65-F5344CB8AC3E}">
-        <p14:creationId xmlns:p14="http://schemas.microsoft.com/office/powerpoint/2010/main" xmlns="" val="1177541819"/>
+        <p14:creationId xmlns:p14="http://schemas.microsoft.com/office/powerpoint/2010/main" val="1177541819"/>
       </p:ext>
     </p:extLst>
   </p:cSld>
   <p:clrMapOvr>
     <a:masterClrMapping/>
   </p:clrMapOvr>
-  <p:timing>
-    <p:tnLst>
-      <p:par>
-        <p:cTn id="1" dur="indefinite" restart="never" nodeType="tmRoot"/>
-      </p:par>
-    </p:tnLst>
-  </p:timing>
 </p:sld>
 </file>
 
@@ -8873,10 +9222,9 @@
           <a:lstStyle/>
           <a:p>
             <a:r>
-              <a:rPr lang="en-US" dirty="0" smtClean="0"/>
+              <a:rPr lang="en-US" dirty="0"/>
               <a:t>PHASES IN AN OFFENSIVE OPERATION</a:t>
             </a:r>
-            <a:endParaRPr lang="en-US" dirty="0"/>
           </a:p>
         </p:txBody>
       </p:sp>
@@ -8925,10 +9273,9 @@
           <a:p>
             <a:pPr algn="ctr"/>
             <a:r>
-              <a:rPr lang="nb-NO" sz="1200" dirty="0" smtClean="0"/>
+              <a:rPr lang="nb-NO" sz="1200" dirty="0"/>
               <a:t>A</a:t>
             </a:r>
-            <a:endParaRPr lang="nb-NO" sz="1200" dirty="0"/>
           </a:p>
         </p:txBody>
       </p:sp>
@@ -8977,10 +9324,9 @@
           <a:p>
             <a:pPr algn="ctr"/>
             <a:r>
-              <a:rPr lang="nb-NO" sz="1200" dirty="0" smtClean="0"/>
+              <a:rPr lang="nb-NO" sz="1200" dirty="0"/>
               <a:t>A</a:t>
             </a:r>
-            <a:endParaRPr lang="nb-NO" sz="1200" dirty="0"/>
           </a:p>
         </p:txBody>
       </p:sp>
@@ -9029,10 +9375,9 @@
           <a:p>
             <a:pPr algn="ctr"/>
             <a:r>
-              <a:rPr lang="nb-NO" sz="1200" dirty="0" smtClean="0"/>
+              <a:rPr lang="nb-NO" sz="1200" dirty="0"/>
               <a:t>B</a:t>
             </a:r>
-            <a:endParaRPr lang="nb-NO" sz="1200" dirty="0"/>
           </a:p>
         </p:txBody>
       </p:sp>
@@ -9081,10 +9426,9 @@
           <a:p>
             <a:pPr algn="ctr"/>
             <a:r>
-              <a:rPr lang="nb-NO" sz="1200" dirty="0" smtClean="0"/>
+              <a:rPr lang="nb-NO" sz="1200" dirty="0"/>
               <a:t>B</a:t>
             </a:r>
-            <a:endParaRPr lang="nb-NO" sz="1200" dirty="0"/>
           </a:p>
         </p:txBody>
       </p:sp>
@@ -9133,10 +9477,9 @@
           <a:p>
             <a:pPr algn="ctr"/>
             <a:r>
-              <a:rPr lang="nb-NO" sz="1200" dirty="0" smtClean="0"/>
+              <a:rPr lang="nb-NO" sz="1200" dirty="0"/>
               <a:t>C</a:t>
             </a:r>
-            <a:endParaRPr lang="nb-NO" sz="1200" dirty="0"/>
           </a:p>
         </p:txBody>
       </p:sp>
@@ -9185,10 +9528,9 @@
           <a:p>
             <a:pPr algn="ctr"/>
             <a:r>
-              <a:rPr lang="nb-NO" sz="1200" dirty="0" smtClean="0"/>
+              <a:rPr lang="nb-NO" sz="1200" dirty="0"/>
               <a:t>C</a:t>
             </a:r>
-            <a:endParaRPr lang="nb-NO" sz="1200" dirty="0"/>
           </a:p>
         </p:txBody>
       </p:sp>
@@ -9237,10 +9579,9 @@
           <a:p>
             <a:pPr algn="ctr"/>
             <a:r>
-              <a:rPr lang="nb-NO" sz="1200" dirty="0" smtClean="0"/>
+              <a:rPr lang="nb-NO" sz="1200" dirty="0"/>
               <a:t>D</a:t>
             </a:r>
-            <a:endParaRPr lang="nb-NO" sz="1200" dirty="0"/>
           </a:p>
         </p:txBody>
       </p:sp>
@@ -9289,10 +9630,9 @@
           <a:p>
             <a:pPr algn="ctr"/>
             <a:r>
-              <a:rPr lang="nb-NO" sz="1200" dirty="0" smtClean="0"/>
+              <a:rPr lang="nb-NO" sz="1200" dirty="0"/>
               <a:t>D</a:t>
             </a:r>
-            <a:endParaRPr lang="nb-NO" sz="1200" dirty="0"/>
           </a:p>
         </p:txBody>
       </p:sp>
@@ -9341,10 +9681,9 @@
           <a:p>
             <a:pPr algn="ctr"/>
             <a:r>
-              <a:rPr lang="nb-NO" sz="1200" dirty="0" smtClean="0"/>
+              <a:rPr lang="nb-NO" sz="1200" dirty="0"/>
               <a:t>E</a:t>
             </a:r>
-            <a:endParaRPr lang="nb-NO" sz="1200" dirty="0"/>
           </a:p>
         </p:txBody>
       </p:sp>
@@ -9393,10 +9732,9 @@
           <a:p>
             <a:pPr algn="ctr"/>
             <a:r>
-              <a:rPr lang="nb-NO" sz="1200" dirty="0" smtClean="0"/>
+              <a:rPr lang="nb-NO" sz="1200" dirty="0"/>
               <a:t>E</a:t>
             </a:r>
-            <a:endParaRPr lang="nb-NO" sz="1200" dirty="0"/>
           </a:p>
         </p:txBody>
       </p:sp>
@@ -9445,10 +9783,9 @@
           <a:p>
             <a:pPr algn="ctr"/>
             <a:r>
-              <a:rPr lang="nb-NO" sz="1200" dirty="0" smtClean="0"/>
+              <a:rPr lang="nb-NO" sz="1200" dirty="0"/>
               <a:t>F</a:t>
             </a:r>
-            <a:endParaRPr lang="nb-NO" sz="1200" dirty="0"/>
           </a:p>
         </p:txBody>
       </p:sp>
@@ -9497,10 +9834,9 @@
           <a:p>
             <a:pPr algn="ctr"/>
             <a:r>
-              <a:rPr lang="nb-NO" sz="1200" dirty="0" smtClean="0"/>
+              <a:rPr lang="nb-NO" sz="1200" dirty="0"/>
               <a:t>F</a:t>
             </a:r>
-            <a:endParaRPr lang="nb-NO" sz="1200" dirty="0"/>
           </a:p>
         </p:txBody>
       </p:sp>
@@ -9531,7 +9867,7 @@
               <a:buChar char="•"/>
             </a:pPr>
             <a:r>
-              <a:rPr lang="nb-NO" dirty="0" smtClean="0"/>
+              <a:rPr lang="nb-NO" dirty="0"/>
               <a:t>Resupply</a:t>
             </a:r>
           </a:p>
@@ -9541,7 +9877,7 @@
               <a:buChar char="•"/>
             </a:pPr>
             <a:r>
-              <a:rPr lang="nb-NO" dirty="0" smtClean="0"/>
+              <a:rPr lang="nb-NO" dirty="0"/>
               <a:t>Staging</a:t>
             </a:r>
           </a:p>
@@ -9551,7 +9887,7 @@
               <a:buChar char="•"/>
             </a:pPr>
             <a:r>
-              <a:rPr lang="nb-NO" dirty="0" smtClean="0"/>
+              <a:rPr lang="nb-NO" dirty="0"/>
               <a:t>Shaping</a:t>
             </a:r>
           </a:p>
@@ -9561,7 +9897,7 @@
               <a:buChar char="•"/>
             </a:pPr>
             <a:r>
-              <a:rPr lang="nb-NO" dirty="0" smtClean="0"/>
+              <a:rPr lang="nb-NO" dirty="0"/>
               <a:t>Assault</a:t>
             </a:r>
           </a:p>
@@ -9571,7 +9907,7 @@
               <a:buChar char="•"/>
             </a:pPr>
             <a:r>
-              <a:rPr lang="nb-NO" dirty="0" smtClean="0"/>
+              <a:rPr lang="nb-NO" dirty="0"/>
               <a:t>Transition into defensive</a:t>
             </a:r>
           </a:p>
@@ -9581,16 +9917,16 @@
               <a:buChar char="•"/>
             </a:pPr>
             <a:r>
-              <a:rPr lang="nb-NO" dirty="0" smtClean="0"/>
+              <a:rPr lang="nb-NO" dirty="0"/>
               <a:t>Recondition, rearm, reload</a:t>
             </a:r>
           </a:p>
           <a:p>
-            <a:endParaRPr lang="nb-NO" dirty="0" smtClean="0"/>
-          </a:p>
-          <a:p>
-            <a:r>
-              <a:rPr lang="nb-NO" dirty="0" smtClean="0"/>
+            <a:endParaRPr lang="nb-NO" dirty="0"/>
+          </a:p>
+          <a:p>
+            <a:r>
+              <a:rPr lang="nb-NO" dirty="0"/>
               <a:t>(With indicators on each of the phases if possible)</a:t>
             </a:r>
           </a:p>
@@ -9601,13 +9937,6 @@
   <p:clrMapOvr>
     <a:masterClrMapping/>
   </p:clrMapOvr>
-  <p:timing>
-    <p:tnLst>
-      <p:par>
-        <p:cTn id="1" dur="indefinite" restart="never" nodeType="tmRoot"/>
-      </p:par>
-    </p:tnLst>
-  </p:timing>
 </p:sld>
 </file>
 
@@ -9649,17 +9978,16 @@
           <a:lstStyle/>
           <a:p>
             <a:r>
-              <a:rPr lang="en-US" dirty="0" smtClean="0"/>
+              <a:rPr lang="en-US" dirty="0"/>
               <a:t>PHASES IN AN OFFENSIVE OPERATION: </a:t>
             </a:r>
             <a:br>
-              <a:rPr lang="en-US" dirty="0" smtClean="0"/>
+              <a:rPr lang="en-US" dirty="0"/>
             </a:br>
             <a:r>
-              <a:rPr lang="en-US" dirty="0" smtClean="0"/>
+              <a:rPr lang="en-US" dirty="0"/>
               <a:t>RESUPPLY / STAGING</a:t>
             </a:r>
-            <a:endParaRPr lang="en-US" dirty="0"/>
           </a:p>
         </p:txBody>
       </p:sp>
@@ -9708,10 +10036,9 @@
           <a:p>
             <a:pPr algn="ctr"/>
             <a:r>
-              <a:rPr lang="nb-NO" sz="1200" dirty="0" smtClean="0"/>
+              <a:rPr lang="nb-NO" sz="1200" dirty="0"/>
               <a:t>A</a:t>
             </a:r>
-            <a:endParaRPr lang="nb-NO" sz="1200" dirty="0"/>
           </a:p>
         </p:txBody>
       </p:sp>
@@ -9760,10 +10087,9 @@
           <a:p>
             <a:pPr algn="ctr"/>
             <a:r>
-              <a:rPr lang="nb-NO" sz="1200" dirty="0" smtClean="0"/>
+              <a:rPr lang="nb-NO" sz="1200" dirty="0"/>
               <a:t>A</a:t>
             </a:r>
-            <a:endParaRPr lang="nb-NO" sz="1200" dirty="0"/>
           </a:p>
         </p:txBody>
       </p:sp>
@@ -9812,10 +10138,9 @@
           <a:p>
             <a:pPr algn="ctr"/>
             <a:r>
-              <a:rPr lang="nb-NO" sz="1200" dirty="0" smtClean="0"/>
+              <a:rPr lang="nb-NO" sz="1200" dirty="0"/>
               <a:t>B</a:t>
             </a:r>
-            <a:endParaRPr lang="nb-NO" sz="1200" dirty="0"/>
           </a:p>
         </p:txBody>
       </p:sp>
@@ -9864,10 +10189,9 @@
           <a:p>
             <a:pPr algn="ctr"/>
             <a:r>
-              <a:rPr lang="nb-NO" sz="1200" dirty="0" smtClean="0"/>
+              <a:rPr lang="nb-NO" sz="1200" dirty="0"/>
               <a:t>B</a:t>
             </a:r>
-            <a:endParaRPr lang="nb-NO" sz="1200" dirty="0"/>
           </a:p>
         </p:txBody>
       </p:sp>
@@ -9916,10 +10240,9 @@
           <a:p>
             <a:pPr algn="ctr"/>
             <a:r>
-              <a:rPr lang="nb-NO" sz="1200" dirty="0" smtClean="0"/>
+              <a:rPr lang="nb-NO" sz="1200" dirty="0"/>
               <a:t>C</a:t>
             </a:r>
-            <a:endParaRPr lang="nb-NO" sz="1200" dirty="0"/>
           </a:p>
         </p:txBody>
       </p:sp>
@@ -9968,10 +10291,9 @@
           <a:p>
             <a:pPr algn="ctr"/>
             <a:r>
-              <a:rPr lang="nb-NO" sz="1200" dirty="0" smtClean="0"/>
+              <a:rPr lang="nb-NO" sz="1200" dirty="0"/>
               <a:t>C</a:t>
             </a:r>
-            <a:endParaRPr lang="nb-NO" sz="1200" dirty="0"/>
           </a:p>
         </p:txBody>
       </p:sp>
@@ -10020,10 +10342,9 @@
           <a:p>
             <a:pPr algn="ctr"/>
             <a:r>
-              <a:rPr lang="nb-NO" sz="1200" dirty="0" smtClean="0"/>
+              <a:rPr lang="nb-NO" sz="1200" dirty="0"/>
               <a:t>D</a:t>
             </a:r>
-            <a:endParaRPr lang="nb-NO" sz="1200" dirty="0"/>
           </a:p>
         </p:txBody>
       </p:sp>
@@ -10072,10 +10393,9 @@
           <a:p>
             <a:pPr algn="ctr"/>
             <a:r>
-              <a:rPr lang="nb-NO" sz="1200" dirty="0" smtClean="0"/>
+              <a:rPr lang="nb-NO" sz="1200" dirty="0"/>
               <a:t>D</a:t>
             </a:r>
-            <a:endParaRPr lang="nb-NO" sz="1200" dirty="0"/>
           </a:p>
         </p:txBody>
       </p:sp>
@@ -10124,10 +10444,9 @@
           <a:p>
             <a:pPr algn="ctr"/>
             <a:r>
-              <a:rPr lang="nb-NO" sz="1200" dirty="0" smtClean="0"/>
+              <a:rPr lang="nb-NO" sz="1200" dirty="0"/>
               <a:t>E</a:t>
             </a:r>
-            <a:endParaRPr lang="nb-NO" sz="1200" dirty="0"/>
           </a:p>
         </p:txBody>
       </p:sp>
@@ -10176,10 +10495,9 @@
           <a:p>
             <a:pPr algn="ctr"/>
             <a:r>
-              <a:rPr lang="nb-NO" sz="1200" dirty="0" smtClean="0"/>
+              <a:rPr lang="nb-NO" sz="1200" dirty="0"/>
               <a:t>E</a:t>
             </a:r>
-            <a:endParaRPr lang="nb-NO" sz="1200" dirty="0"/>
           </a:p>
         </p:txBody>
       </p:sp>
@@ -10228,10 +10546,9 @@
           <a:p>
             <a:pPr algn="ctr"/>
             <a:r>
-              <a:rPr lang="nb-NO" sz="1200" dirty="0" smtClean="0"/>
+              <a:rPr lang="nb-NO" sz="1200" dirty="0"/>
               <a:t>F</a:t>
             </a:r>
-            <a:endParaRPr lang="nb-NO" sz="1200" dirty="0"/>
           </a:p>
         </p:txBody>
       </p:sp>
@@ -10280,10 +10597,9 @@
           <a:p>
             <a:pPr algn="ctr"/>
             <a:r>
-              <a:rPr lang="nb-NO" sz="1200" dirty="0" smtClean="0"/>
+              <a:rPr lang="nb-NO" sz="1200" dirty="0"/>
               <a:t>F</a:t>
             </a:r>
-            <a:endParaRPr lang="nb-NO" sz="1200" dirty="0"/>
           </a:p>
         </p:txBody>
       </p:sp>
@@ -10310,22 +10626,22 @@
           <a:lstStyle/>
           <a:p>
             <a:r>
-              <a:rPr lang="nb-NO" b="1" dirty="0" smtClean="0"/>
+              <a:rPr lang="nb-NO" b="1" dirty="0"/>
               <a:t>Purpose:</a:t>
             </a:r>
           </a:p>
           <a:p>
             <a:r>
-              <a:rPr lang="nb-NO" dirty="0" smtClean="0"/>
+              <a:rPr lang="nb-NO" dirty="0"/>
               <a:t>Provide all combat teams and vehicles with all supply needed for the coming offensive</a:t>
             </a:r>
           </a:p>
           <a:p>
-            <a:endParaRPr lang="nb-NO" dirty="0" smtClean="0"/>
-          </a:p>
-          <a:p>
-            <a:r>
-              <a:rPr lang="nb-NO" b="1" dirty="0" smtClean="0"/>
+            <a:endParaRPr lang="nb-NO" dirty="0"/>
+          </a:p>
+          <a:p>
+            <a:r>
+              <a:rPr lang="nb-NO" b="1" dirty="0"/>
               <a:t>Activity:</a:t>
             </a:r>
           </a:p>
@@ -10335,7 +10651,7 @@
               <a:buChar char="-"/>
             </a:pPr>
             <a:r>
-              <a:rPr lang="nb-NO" dirty="0" smtClean="0"/>
+              <a:rPr lang="nb-NO" dirty="0"/>
               <a:t>Combat vehicles mostly gathered in parking lots (With exception of vehicles standing guard on frontline and active ADS)</a:t>
             </a:r>
           </a:p>
@@ -10345,7 +10661,7 @@
               <a:buChar char="-"/>
             </a:pPr>
             <a:r>
-              <a:rPr lang="nb-NO" dirty="0" smtClean="0"/>
+              <a:rPr lang="nb-NO" dirty="0"/>
               <a:t>Resupply trucks delivering supplies to combat vehicles and personnel</a:t>
             </a:r>
           </a:p>
@@ -10355,16 +10671,16 @@
               <a:buChar char="-"/>
             </a:pPr>
             <a:r>
-              <a:rPr lang="nb-NO" dirty="0" smtClean="0"/>
+              <a:rPr lang="nb-NO" dirty="0"/>
               <a:t>Some vehicles undergoing maintenance and will not be combat-ready</a:t>
             </a:r>
           </a:p>
           <a:p>
-            <a:endParaRPr lang="nb-NO" dirty="0" smtClean="0"/>
-          </a:p>
-          <a:p>
-            <a:r>
-              <a:rPr lang="nb-NO" b="1" dirty="0" smtClean="0"/>
+            <a:endParaRPr lang="nb-NO" dirty="0"/>
+          </a:p>
+          <a:p>
+            <a:r>
+              <a:rPr lang="nb-NO" b="1" dirty="0"/>
               <a:t>Indicators:</a:t>
             </a:r>
           </a:p>
@@ -10374,7 +10690,7 @@
               <a:buChar char="-"/>
             </a:pPr>
             <a:r>
-              <a:rPr lang="nb-NO" dirty="0" smtClean="0"/>
+              <a:rPr lang="nb-NO" dirty="0"/>
               <a:t>Combat vehicles arranged in non-combat formations (lines/raws, tight together)</a:t>
             </a:r>
           </a:p>
@@ -10384,7 +10700,7 @@
               <a:buChar char="-"/>
             </a:pPr>
             <a:r>
-              <a:rPr lang="nb-NO" dirty="0" smtClean="0"/>
+              <a:rPr lang="nb-NO" dirty="0"/>
               <a:t>Supply trucks in close vicinity</a:t>
             </a:r>
           </a:p>
@@ -10393,34 +10709,27 @@
               <a:buFontTx/>
               <a:buChar char="-"/>
             </a:pPr>
-            <a:endParaRPr lang="nb-NO" dirty="0" smtClean="0"/>
+            <a:endParaRPr lang="nb-NO" dirty="0"/>
           </a:p>
           <a:p>
             <a:pPr marL="285750" indent="-285750">
               <a:buFontTx/>
               <a:buChar char="-"/>
             </a:pPr>
-            <a:endParaRPr lang="nb-NO" dirty="0" smtClean="0"/>
+            <a:endParaRPr lang="nb-NO" dirty="0"/>
           </a:p>
         </p:txBody>
       </p:sp>
     </p:spTree>
     <p:extLst>
       <p:ext uri="{BB962C8B-B14F-4D97-AF65-F5344CB8AC3E}">
-        <p14:creationId xmlns:p14="http://schemas.microsoft.com/office/powerpoint/2010/main" xmlns="" val="390204938"/>
+        <p14:creationId xmlns:p14="http://schemas.microsoft.com/office/powerpoint/2010/main" val="390204938"/>
       </p:ext>
     </p:extLst>
   </p:cSld>
   <p:clrMapOvr>
     <a:masterClrMapping/>
   </p:clrMapOvr>
-  <p:timing>
-    <p:tnLst>
-      <p:par>
-        <p:cTn id="1" dur="indefinite" restart="never" nodeType="tmRoot"/>
-      </p:par>
-    </p:tnLst>
-  </p:timing>
 </p:sld>
 </file>
 
@@ -10462,17 +10771,16 @@
           <a:lstStyle/>
           <a:p>
             <a:r>
-              <a:rPr lang="en-US" dirty="0" smtClean="0"/>
+              <a:rPr lang="en-US" dirty="0"/>
               <a:t>PHASES IN AN OFFENSIVE OPERATION: </a:t>
             </a:r>
             <a:br>
-              <a:rPr lang="en-US" dirty="0" smtClean="0"/>
+              <a:rPr lang="en-US" dirty="0"/>
             </a:br>
             <a:r>
-              <a:rPr lang="en-US" dirty="0" smtClean="0"/>
+              <a:rPr lang="en-US" dirty="0"/>
               <a:t>SHAPING</a:t>
             </a:r>
-            <a:endParaRPr lang="en-US" dirty="0"/>
           </a:p>
         </p:txBody>
       </p:sp>
@@ -10521,10 +10829,9 @@
           <a:p>
             <a:pPr algn="ctr"/>
             <a:r>
-              <a:rPr lang="nb-NO" sz="1200" dirty="0" smtClean="0"/>
+              <a:rPr lang="nb-NO" sz="1200" dirty="0"/>
               <a:t>A</a:t>
             </a:r>
-            <a:endParaRPr lang="nb-NO" sz="1200" dirty="0"/>
           </a:p>
         </p:txBody>
       </p:sp>
@@ -10573,10 +10880,9 @@
           <a:p>
             <a:pPr algn="ctr"/>
             <a:r>
-              <a:rPr lang="nb-NO" sz="1200" dirty="0" smtClean="0"/>
+              <a:rPr lang="nb-NO" sz="1200" dirty="0"/>
               <a:t>A</a:t>
             </a:r>
-            <a:endParaRPr lang="nb-NO" sz="1200" dirty="0"/>
           </a:p>
         </p:txBody>
       </p:sp>
@@ -10625,10 +10931,9 @@
           <a:p>
             <a:pPr algn="ctr"/>
             <a:r>
-              <a:rPr lang="nb-NO" sz="1200" dirty="0" smtClean="0"/>
+              <a:rPr lang="nb-NO" sz="1200" dirty="0"/>
               <a:t>B</a:t>
             </a:r>
-            <a:endParaRPr lang="nb-NO" sz="1200" dirty="0"/>
           </a:p>
         </p:txBody>
       </p:sp>
@@ -10677,10 +10982,9 @@
           <a:p>
             <a:pPr algn="ctr"/>
             <a:r>
-              <a:rPr lang="nb-NO" sz="1200" dirty="0" smtClean="0"/>
+              <a:rPr lang="nb-NO" sz="1200" dirty="0"/>
               <a:t>B</a:t>
             </a:r>
-            <a:endParaRPr lang="nb-NO" sz="1200" dirty="0"/>
           </a:p>
         </p:txBody>
       </p:sp>
@@ -10729,10 +11033,9 @@
           <a:p>
             <a:pPr algn="ctr"/>
             <a:r>
-              <a:rPr lang="nb-NO" sz="1200" dirty="0" smtClean="0"/>
+              <a:rPr lang="nb-NO" sz="1200" dirty="0"/>
               <a:t>C</a:t>
             </a:r>
-            <a:endParaRPr lang="nb-NO" sz="1200" dirty="0"/>
           </a:p>
         </p:txBody>
       </p:sp>
@@ -10781,10 +11084,9 @@
           <a:p>
             <a:pPr algn="ctr"/>
             <a:r>
-              <a:rPr lang="nb-NO" sz="1200" dirty="0" smtClean="0"/>
+              <a:rPr lang="nb-NO" sz="1200" dirty="0"/>
               <a:t>C</a:t>
             </a:r>
-            <a:endParaRPr lang="nb-NO" sz="1200" dirty="0"/>
           </a:p>
         </p:txBody>
       </p:sp>
@@ -10833,10 +11135,9 @@
           <a:p>
             <a:pPr algn="ctr"/>
             <a:r>
-              <a:rPr lang="nb-NO" sz="1200" dirty="0" smtClean="0"/>
+              <a:rPr lang="nb-NO" sz="1200" dirty="0"/>
               <a:t>D</a:t>
             </a:r>
-            <a:endParaRPr lang="nb-NO" sz="1200" dirty="0"/>
           </a:p>
         </p:txBody>
       </p:sp>
@@ -10885,10 +11186,9 @@
           <a:p>
             <a:pPr algn="ctr"/>
             <a:r>
-              <a:rPr lang="nb-NO" sz="1200" dirty="0" smtClean="0"/>
+              <a:rPr lang="nb-NO" sz="1200" dirty="0"/>
               <a:t>D</a:t>
             </a:r>
-            <a:endParaRPr lang="nb-NO" sz="1200" dirty="0"/>
           </a:p>
         </p:txBody>
       </p:sp>
@@ -10937,10 +11237,9 @@
           <a:p>
             <a:pPr algn="ctr"/>
             <a:r>
-              <a:rPr lang="nb-NO" sz="1200" dirty="0" smtClean="0"/>
+              <a:rPr lang="nb-NO" sz="1200" dirty="0"/>
               <a:t>E</a:t>
             </a:r>
-            <a:endParaRPr lang="nb-NO" sz="1200" dirty="0"/>
           </a:p>
         </p:txBody>
       </p:sp>
@@ -10989,10 +11288,9 @@
           <a:p>
             <a:pPr algn="ctr"/>
             <a:r>
-              <a:rPr lang="nb-NO" sz="1200" dirty="0" smtClean="0"/>
+              <a:rPr lang="nb-NO" sz="1200" dirty="0"/>
               <a:t>E</a:t>
             </a:r>
-            <a:endParaRPr lang="nb-NO" sz="1200" dirty="0"/>
           </a:p>
         </p:txBody>
       </p:sp>
@@ -11041,10 +11339,9 @@
           <a:p>
             <a:pPr algn="ctr"/>
             <a:r>
-              <a:rPr lang="nb-NO" sz="1200" dirty="0" smtClean="0"/>
+              <a:rPr lang="nb-NO" sz="1200" dirty="0"/>
               <a:t>F</a:t>
             </a:r>
-            <a:endParaRPr lang="nb-NO" sz="1200" dirty="0"/>
           </a:p>
         </p:txBody>
       </p:sp>
@@ -11093,10 +11390,9 @@
           <a:p>
             <a:pPr algn="ctr"/>
             <a:r>
-              <a:rPr lang="nb-NO" sz="1200" dirty="0" smtClean="0"/>
+              <a:rPr lang="nb-NO" sz="1200" dirty="0"/>
               <a:t>F</a:t>
             </a:r>
-            <a:endParaRPr lang="nb-NO" sz="1200" dirty="0"/>
           </a:p>
         </p:txBody>
       </p:sp>
@@ -11123,22 +11419,22 @@
           <a:lstStyle/>
           <a:p>
             <a:r>
-              <a:rPr lang="nb-NO" sz="1600" b="1" dirty="0" smtClean="0"/>
+              <a:rPr lang="nb-NO" sz="1600" b="1" dirty="0"/>
               <a:t>Purpose:</a:t>
             </a:r>
           </a:p>
           <a:p>
             <a:r>
-              <a:rPr lang="nb-NO" sz="1600" dirty="0" smtClean="0"/>
+              <a:rPr lang="nb-NO" sz="1600" dirty="0"/>
               <a:t>Shape the conditions in the battlefield to be in favor of the offensive force by hindering the enemy’s ability to counter the coming offensive.</a:t>
             </a:r>
           </a:p>
           <a:p>
-            <a:endParaRPr lang="nb-NO" sz="1600" dirty="0" smtClean="0"/>
-          </a:p>
-          <a:p>
-            <a:r>
-              <a:rPr lang="nb-NO" sz="1600" b="1" dirty="0" smtClean="0"/>
+            <a:endParaRPr lang="nb-NO" sz="1600" dirty="0"/>
+          </a:p>
+          <a:p>
+            <a:r>
+              <a:rPr lang="nb-NO" sz="1600" b="1" dirty="0"/>
               <a:t>Activity:</a:t>
             </a:r>
           </a:p>
@@ -11148,7 +11444,7 @@
               <a:buChar char="-"/>
             </a:pPr>
             <a:r>
-              <a:rPr lang="nb-NO" sz="1600" dirty="0" smtClean="0"/>
+              <a:rPr lang="nb-NO" sz="1600" dirty="0"/>
               <a:t>Artillery opens fire to harrass, suppress or destroy enemy positions such as observation-posts, command/control positions, communication sites, staging areas , artillery positions etc’</a:t>
             </a:r>
           </a:p>
@@ -11158,16 +11454,16 @@
               <a:buChar char="-"/>
             </a:pPr>
             <a:r>
-              <a:rPr lang="nb-NO" sz="1600" dirty="0" smtClean="0"/>
+              <a:rPr lang="nb-NO" sz="1600" dirty="0"/>
               <a:t>Insertion of special operation forces (SOFs) to deny the enemy of observation points, close roads and chockpoints which may be used by the enemy to move/resupply or reinforce his defending forces</a:t>
             </a:r>
           </a:p>
           <a:p>
-            <a:endParaRPr lang="nb-NO" sz="1600" dirty="0" smtClean="0"/>
-          </a:p>
-          <a:p>
-            <a:r>
-              <a:rPr lang="nb-NO" sz="1600" b="1" dirty="0" smtClean="0"/>
+            <a:endParaRPr lang="nb-NO" sz="1600" dirty="0"/>
+          </a:p>
+          <a:p>
+            <a:r>
+              <a:rPr lang="nb-NO" sz="1600" b="1" dirty="0"/>
               <a:t>Indicators:</a:t>
             </a:r>
           </a:p>
@@ -11177,7 +11473,7 @@
               <a:buChar char="-"/>
             </a:pPr>
             <a:r>
-              <a:rPr lang="nb-NO" sz="1600" dirty="0" smtClean="0"/>
+              <a:rPr lang="nb-NO" sz="1600" dirty="0"/>
               <a:t>Artillery fire falls sustained by units not currently involved in combat</a:t>
             </a:r>
           </a:p>
@@ -11187,7 +11483,7 @@
               <a:buChar char="-"/>
             </a:pPr>
             <a:r>
-              <a:rPr lang="nb-NO" sz="1600" dirty="0" smtClean="0"/>
+              <a:rPr lang="nb-NO" sz="1600" dirty="0"/>
               <a:t>Reports of rear units (convoys or staging areas) reporting being hit by artillery or ambush teams</a:t>
             </a:r>
           </a:p>
@@ -11197,7 +11493,7 @@
               <a:buChar char="-"/>
             </a:pPr>
             <a:r>
-              <a:rPr lang="nb-NO" sz="1600" dirty="0" smtClean="0"/>
+              <a:rPr lang="nb-NO" sz="1600" dirty="0"/>
               <a:t>Loss of contact with observation posts (Suggesting either they’ve fallen to a raid by enemy SOFs or that the communications line have been severed by enemy artillery/SOF activity</a:t>
             </a:r>
           </a:p>
@@ -11206,34 +11502,27 @@
               <a:buFontTx/>
               <a:buChar char="-"/>
             </a:pPr>
-            <a:endParaRPr lang="nb-NO" sz="1600" dirty="0" smtClean="0"/>
+            <a:endParaRPr lang="nb-NO" sz="1600" dirty="0"/>
           </a:p>
           <a:p>
             <a:pPr marL="285750" indent="-285750">
               <a:buFontTx/>
               <a:buChar char="-"/>
             </a:pPr>
-            <a:endParaRPr lang="nb-NO" sz="1600" dirty="0" smtClean="0"/>
+            <a:endParaRPr lang="nb-NO" sz="1600" dirty="0"/>
           </a:p>
         </p:txBody>
       </p:sp>
     </p:spTree>
     <p:extLst>
       <p:ext uri="{BB962C8B-B14F-4D97-AF65-F5344CB8AC3E}">
-        <p14:creationId xmlns:p14="http://schemas.microsoft.com/office/powerpoint/2010/main" xmlns="" val="4063869597"/>
+        <p14:creationId xmlns:p14="http://schemas.microsoft.com/office/powerpoint/2010/main" val="4063869597"/>
       </p:ext>
     </p:extLst>
   </p:cSld>
   <p:clrMapOvr>
     <a:masterClrMapping/>
   </p:clrMapOvr>
-  <p:timing>
-    <p:tnLst>
-      <p:par>
-        <p:cTn id="1" dur="indefinite" restart="never" nodeType="tmRoot"/>
-      </p:par>
-    </p:tnLst>
-  </p:timing>
 </p:sld>
 </file>
 
@@ -11275,17 +11564,16 @@
           <a:lstStyle/>
           <a:p>
             <a:r>
-              <a:rPr lang="en-US" dirty="0" smtClean="0"/>
+              <a:rPr lang="en-US" dirty="0"/>
               <a:t>PHASES IN AN OFFENSIVE OPERATION: </a:t>
             </a:r>
             <a:br>
-              <a:rPr lang="en-US" dirty="0" smtClean="0"/>
+              <a:rPr lang="en-US" dirty="0"/>
             </a:br>
             <a:r>
-              <a:rPr lang="en-US" dirty="0" smtClean="0"/>
+              <a:rPr lang="en-US" dirty="0"/>
               <a:t>ASSAULT</a:t>
             </a:r>
-            <a:endParaRPr lang="en-US" dirty="0"/>
           </a:p>
         </p:txBody>
       </p:sp>
@@ -11334,10 +11622,9 @@
           <a:p>
             <a:pPr algn="ctr"/>
             <a:r>
-              <a:rPr lang="nb-NO" sz="1200" dirty="0" smtClean="0"/>
+              <a:rPr lang="nb-NO" sz="1200" dirty="0"/>
               <a:t>A</a:t>
             </a:r>
-            <a:endParaRPr lang="nb-NO" sz="1200" dirty="0"/>
           </a:p>
         </p:txBody>
       </p:sp>
@@ -11386,10 +11673,9 @@
           <a:p>
             <a:pPr algn="ctr"/>
             <a:r>
-              <a:rPr lang="nb-NO" sz="1200" dirty="0" smtClean="0"/>
+              <a:rPr lang="nb-NO" sz="1200" dirty="0"/>
               <a:t>A</a:t>
             </a:r>
-            <a:endParaRPr lang="nb-NO" sz="1200" dirty="0"/>
           </a:p>
         </p:txBody>
       </p:sp>
@@ -11438,10 +11724,9 @@
           <a:p>
             <a:pPr algn="ctr"/>
             <a:r>
-              <a:rPr lang="nb-NO" sz="1200" dirty="0" smtClean="0"/>
+              <a:rPr lang="nb-NO" sz="1200" dirty="0"/>
               <a:t>B</a:t>
             </a:r>
-            <a:endParaRPr lang="nb-NO" sz="1200" dirty="0"/>
           </a:p>
         </p:txBody>
       </p:sp>
@@ -11490,10 +11775,9 @@
           <a:p>
             <a:pPr algn="ctr"/>
             <a:r>
-              <a:rPr lang="nb-NO" sz="1200" dirty="0" smtClean="0"/>
+              <a:rPr lang="nb-NO" sz="1200" dirty="0"/>
               <a:t>B</a:t>
             </a:r>
-            <a:endParaRPr lang="nb-NO" sz="1200" dirty="0"/>
           </a:p>
         </p:txBody>
       </p:sp>
@@ -11542,10 +11826,9 @@
           <a:p>
             <a:pPr algn="ctr"/>
             <a:r>
-              <a:rPr lang="nb-NO" sz="1200" dirty="0" smtClean="0"/>
+              <a:rPr lang="nb-NO" sz="1200" dirty="0"/>
               <a:t>C</a:t>
             </a:r>
-            <a:endParaRPr lang="nb-NO" sz="1200" dirty="0"/>
           </a:p>
         </p:txBody>
       </p:sp>
@@ -11594,10 +11877,9 @@
           <a:p>
             <a:pPr algn="ctr"/>
             <a:r>
-              <a:rPr lang="nb-NO" sz="1200" dirty="0" smtClean="0"/>
+              <a:rPr lang="nb-NO" sz="1200" dirty="0"/>
               <a:t>C</a:t>
             </a:r>
-            <a:endParaRPr lang="nb-NO" sz="1200" dirty="0"/>
           </a:p>
         </p:txBody>
       </p:sp>
@@ -11646,10 +11928,9 @@
           <a:p>
             <a:pPr algn="ctr"/>
             <a:r>
-              <a:rPr lang="nb-NO" sz="1200" dirty="0" smtClean="0"/>
+              <a:rPr lang="nb-NO" sz="1200" dirty="0"/>
               <a:t>D</a:t>
             </a:r>
-            <a:endParaRPr lang="nb-NO" sz="1200" dirty="0"/>
           </a:p>
         </p:txBody>
       </p:sp>
@@ -11698,10 +11979,9 @@
           <a:p>
             <a:pPr algn="ctr"/>
             <a:r>
-              <a:rPr lang="nb-NO" sz="1200" dirty="0" smtClean="0"/>
+              <a:rPr lang="nb-NO" sz="1200" dirty="0"/>
               <a:t>D</a:t>
             </a:r>
-            <a:endParaRPr lang="nb-NO" sz="1200" dirty="0"/>
           </a:p>
         </p:txBody>
       </p:sp>
@@ -11750,10 +12030,9 @@
           <a:p>
             <a:pPr algn="ctr"/>
             <a:r>
-              <a:rPr lang="nb-NO" sz="1200" dirty="0" smtClean="0"/>
+              <a:rPr lang="nb-NO" sz="1200" dirty="0"/>
               <a:t>E</a:t>
             </a:r>
-            <a:endParaRPr lang="nb-NO" sz="1200" dirty="0"/>
           </a:p>
         </p:txBody>
       </p:sp>
@@ -11802,10 +12081,9 @@
           <a:p>
             <a:pPr algn="ctr"/>
             <a:r>
-              <a:rPr lang="nb-NO" sz="1200" dirty="0" smtClean="0"/>
+              <a:rPr lang="nb-NO" sz="1200" dirty="0"/>
               <a:t>E</a:t>
             </a:r>
-            <a:endParaRPr lang="nb-NO" sz="1200" dirty="0"/>
           </a:p>
         </p:txBody>
       </p:sp>
@@ -11854,10 +12132,9 @@
           <a:p>
             <a:pPr algn="ctr"/>
             <a:r>
-              <a:rPr lang="nb-NO" sz="1200" dirty="0" smtClean="0"/>
+              <a:rPr lang="nb-NO" sz="1200" dirty="0"/>
               <a:t>F</a:t>
             </a:r>
-            <a:endParaRPr lang="nb-NO" sz="1200" dirty="0"/>
           </a:p>
         </p:txBody>
       </p:sp>
@@ -11906,10 +12183,9 @@
           <a:p>
             <a:pPr algn="ctr"/>
             <a:r>
-              <a:rPr lang="nb-NO" sz="1200" dirty="0" smtClean="0"/>
+              <a:rPr lang="nb-NO" sz="1200" dirty="0"/>
               <a:t>F</a:t>
             </a:r>
-            <a:endParaRPr lang="nb-NO" sz="1200" dirty="0"/>
           </a:p>
         </p:txBody>
       </p:sp>
@@ -11936,22 +12212,22 @@
           <a:lstStyle/>
           <a:p>
             <a:r>
-              <a:rPr lang="nb-NO" sz="1600" b="1" dirty="0" smtClean="0"/>
+              <a:rPr lang="nb-NO" sz="1600" b="1" dirty="0"/>
               <a:t>Purpose:</a:t>
             </a:r>
           </a:p>
           <a:p>
             <a:r>
-              <a:rPr lang="nb-NO" sz="1600" dirty="0" smtClean="0"/>
+              <a:rPr lang="nb-NO" sz="1600" dirty="0"/>
               <a:t>Utilize the unit’s manuevering forces to achieve the objective of the offensive (territorial gain or tactical or strategic condition).</a:t>
             </a:r>
           </a:p>
           <a:p>
-            <a:endParaRPr lang="nb-NO" sz="1600" dirty="0" smtClean="0"/>
-          </a:p>
-          <a:p>
-            <a:r>
-              <a:rPr lang="nb-NO" sz="1600" b="1" dirty="0" smtClean="0"/>
+            <a:endParaRPr lang="nb-NO" sz="1600" dirty="0"/>
+          </a:p>
+          <a:p>
+            <a:r>
+              <a:rPr lang="nb-NO" sz="1600" b="1" dirty="0"/>
               <a:t>Activity:</a:t>
             </a:r>
           </a:p>
@@ -11961,7 +12237,7 @@
               <a:buChar char="-"/>
             </a:pPr>
             <a:r>
-              <a:rPr lang="nb-NO" sz="1600" dirty="0" smtClean="0"/>
+              <a:rPr lang="nb-NO" sz="1600" dirty="0"/>
               <a:t>Attack conducted by the manuevering brigades</a:t>
             </a:r>
           </a:p>
@@ -11971,16 +12247,16 @@
               <a:buChar char="-"/>
             </a:pPr>
             <a:r>
-              <a:rPr lang="nb-NO" sz="1600" dirty="0" smtClean="0"/>
+              <a:rPr lang="nb-NO" sz="1600" dirty="0"/>
               <a:t>Utilization of supporting assets such as artillery and air-support</a:t>
             </a:r>
           </a:p>
           <a:p>
-            <a:endParaRPr lang="nb-NO" sz="1600" dirty="0" smtClean="0"/>
-          </a:p>
-          <a:p>
-            <a:r>
-              <a:rPr lang="nb-NO" sz="1600" b="1" dirty="0" smtClean="0"/>
+            <a:endParaRPr lang="nb-NO" sz="1600" dirty="0"/>
+          </a:p>
+          <a:p>
+            <a:r>
+              <a:rPr lang="nb-NO" sz="1600" b="1" dirty="0"/>
               <a:t>Indicators:</a:t>
             </a:r>
           </a:p>
@@ -11990,7 +12266,7 @@
               <a:buChar char="-"/>
             </a:pPr>
             <a:r>
-              <a:rPr lang="nb-NO" sz="1600" dirty="0" smtClean="0"/>
+              <a:rPr lang="nb-NO" sz="1600" dirty="0"/>
               <a:t>Movement by some or all of the manuevering brigades pushing the FLOT</a:t>
             </a:r>
           </a:p>
@@ -11999,41 +12275,34 @@
               <a:buFontTx/>
               <a:buChar char="-"/>
             </a:pPr>
-            <a:endParaRPr lang="nb-NO" sz="1600" dirty="0" smtClean="0"/>
+            <a:endParaRPr lang="nb-NO" sz="1600" dirty="0"/>
           </a:p>
           <a:p>
             <a:pPr marL="285750" indent="-285750">
               <a:buFontTx/>
               <a:buChar char="-"/>
             </a:pPr>
-            <a:endParaRPr lang="nb-NO" sz="1600" dirty="0" smtClean="0"/>
+            <a:endParaRPr lang="nb-NO" sz="1600" dirty="0"/>
           </a:p>
           <a:p>
             <a:pPr marL="285750" indent="-285750">
               <a:buFontTx/>
               <a:buChar char="-"/>
             </a:pPr>
-            <a:endParaRPr lang="nb-NO" sz="1600" dirty="0" smtClean="0"/>
+            <a:endParaRPr lang="nb-NO" sz="1600" dirty="0"/>
           </a:p>
         </p:txBody>
       </p:sp>
     </p:spTree>
     <p:extLst>
       <p:ext uri="{BB962C8B-B14F-4D97-AF65-F5344CB8AC3E}">
-        <p14:creationId xmlns:p14="http://schemas.microsoft.com/office/powerpoint/2010/main" xmlns="" val="3349576044"/>
+        <p14:creationId xmlns:p14="http://schemas.microsoft.com/office/powerpoint/2010/main" val="3349576044"/>
       </p:ext>
     </p:extLst>
   </p:cSld>
   <p:clrMapOvr>
     <a:masterClrMapping/>
   </p:clrMapOvr>
-  <p:timing>
-    <p:tnLst>
-      <p:par>
-        <p:cTn id="1" dur="indefinite" restart="never" nodeType="tmRoot"/>
-      </p:par>
-    </p:tnLst>
-  </p:timing>
 </p:sld>
 </file>
 
@@ -12070,10 +12339,9 @@
           <a:lstStyle/>
           <a:p>
             <a:r>
-              <a:rPr lang="en-US" dirty="0" smtClean="0"/>
+              <a:rPr lang="en-US" dirty="0"/>
               <a:t>DIVISION DEFENSIVE</a:t>
             </a:r>
-            <a:endParaRPr lang="en-US" dirty="0"/>
           </a:p>
         </p:txBody>
       </p:sp>
@@ -12122,10 +12390,9 @@
           <a:p>
             <a:pPr algn="ctr"/>
             <a:r>
-              <a:rPr lang="nb-NO" sz="1200" dirty="0" smtClean="0"/>
+              <a:rPr lang="nb-NO" sz="1200" dirty="0"/>
               <a:t>A</a:t>
             </a:r>
-            <a:endParaRPr lang="nb-NO" sz="1200" dirty="0"/>
           </a:p>
         </p:txBody>
       </p:sp>
@@ -12174,10 +12441,9 @@
           <a:p>
             <a:pPr algn="ctr"/>
             <a:r>
-              <a:rPr lang="nb-NO" sz="1200" dirty="0" smtClean="0"/>
+              <a:rPr lang="nb-NO" sz="1200" dirty="0"/>
               <a:t>A</a:t>
             </a:r>
-            <a:endParaRPr lang="nb-NO" sz="1200" dirty="0"/>
           </a:p>
         </p:txBody>
       </p:sp>
@@ -12226,10 +12492,9 @@
           <a:p>
             <a:pPr algn="ctr"/>
             <a:r>
-              <a:rPr lang="nb-NO" sz="1200" dirty="0" smtClean="0"/>
+              <a:rPr lang="nb-NO" sz="1200" dirty="0"/>
               <a:t>B</a:t>
             </a:r>
-            <a:endParaRPr lang="nb-NO" sz="1200" dirty="0"/>
           </a:p>
         </p:txBody>
       </p:sp>
@@ -12278,10 +12543,9 @@
           <a:p>
             <a:pPr algn="ctr"/>
             <a:r>
-              <a:rPr lang="nb-NO" sz="1200" dirty="0" smtClean="0"/>
+              <a:rPr lang="nb-NO" sz="1200" dirty="0"/>
               <a:t>B</a:t>
             </a:r>
-            <a:endParaRPr lang="nb-NO" sz="1200" dirty="0"/>
           </a:p>
         </p:txBody>
       </p:sp>
@@ -12330,10 +12594,9 @@
           <a:p>
             <a:pPr algn="ctr"/>
             <a:r>
-              <a:rPr lang="nb-NO" sz="1200" dirty="0" smtClean="0"/>
+              <a:rPr lang="nb-NO" sz="1200" dirty="0"/>
               <a:t>C</a:t>
             </a:r>
-            <a:endParaRPr lang="nb-NO" sz="1200" dirty="0"/>
           </a:p>
         </p:txBody>
       </p:sp>
@@ -12382,10 +12645,9 @@
           <a:p>
             <a:pPr algn="ctr"/>
             <a:r>
-              <a:rPr lang="nb-NO" sz="1200" dirty="0" smtClean="0"/>
+              <a:rPr lang="nb-NO" sz="1200" dirty="0"/>
               <a:t>C</a:t>
             </a:r>
-            <a:endParaRPr lang="nb-NO" sz="1200" dirty="0"/>
           </a:p>
         </p:txBody>
       </p:sp>
@@ -12434,10 +12696,9 @@
           <a:p>
             <a:pPr algn="ctr"/>
             <a:r>
-              <a:rPr lang="nb-NO" sz="1200" dirty="0" smtClean="0"/>
+              <a:rPr lang="nb-NO" sz="1200" dirty="0"/>
               <a:t>D</a:t>
             </a:r>
-            <a:endParaRPr lang="nb-NO" sz="1200" dirty="0"/>
           </a:p>
         </p:txBody>
       </p:sp>
@@ -12486,10 +12747,9 @@
           <a:p>
             <a:pPr algn="ctr"/>
             <a:r>
-              <a:rPr lang="nb-NO" sz="1200" dirty="0" smtClean="0"/>
+              <a:rPr lang="nb-NO" sz="1200" dirty="0"/>
               <a:t>D</a:t>
             </a:r>
-            <a:endParaRPr lang="nb-NO" sz="1200" dirty="0"/>
           </a:p>
         </p:txBody>
       </p:sp>
@@ -12538,10 +12798,9 @@
           <a:p>
             <a:pPr algn="ctr"/>
             <a:r>
-              <a:rPr lang="nb-NO" sz="1200" dirty="0" smtClean="0"/>
+              <a:rPr lang="nb-NO" sz="1200" dirty="0"/>
               <a:t>E</a:t>
             </a:r>
-            <a:endParaRPr lang="nb-NO" sz="1200" dirty="0"/>
           </a:p>
         </p:txBody>
       </p:sp>
@@ -12590,10 +12849,9 @@
           <a:p>
             <a:pPr algn="ctr"/>
             <a:r>
-              <a:rPr lang="nb-NO" sz="1200" dirty="0" smtClean="0"/>
+              <a:rPr lang="nb-NO" sz="1200" dirty="0"/>
               <a:t>E</a:t>
             </a:r>
-            <a:endParaRPr lang="nb-NO" sz="1200" dirty="0"/>
           </a:p>
         </p:txBody>
       </p:sp>
@@ -12642,10 +12900,9 @@
           <a:p>
             <a:pPr algn="ctr"/>
             <a:r>
-              <a:rPr lang="nb-NO" sz="1200" dirty="0" smtClean="0"/>
+              <a:rPr lang="nb-NO" sz="1200" dirty="0"/>
               <a:t>F</a:t>
             </a:r>
-            <a:endParaRPr lang="nb-NO" sz="1200" dirty="0"/>
           </a:p>
         </p:txBody>
       </p:sp>
@@ -12694,10 +12951,9 @@
           <a:p>
             <a:pPr algn="ctr"/>
             <a:r>
-              <a:rPr lang="nb-NO" sz="1200" dirty="0" smtClean="0"/>
+              <a:rPr lang="nb-NO" sz="1200" dirty="0"/>
               <a:t>F</a:t>
             </a:r>
-            <a:endParaRPr lang="nb-NO" sz="1200" dirty="0"/>
           </a:p>
         </p:txBody>
       </p:sp>
@@ -12724,7 +12980,7 @@
           <a:lstStyle/>
           <a:p>
             <a:r>
-              <a:rPr lang="nb-NO" sz="1600" b="1" dirty="0" smtClean="0"/>
+              <a:rPr lang="nb-NO" sz="1600" b="1" dirty="0"/>
               <a:t>Purpose:</a:t>
             </a:r>
           </a:p>
@@ -12734,7 +12990,7 @@
               <a:buChar char="-"/>
             </a:pPr>
             <a:r>
-              <a:rPr lang="nb-NO" sz="1600" dirty="0" smtClean="0"/>
+              <a:rPr lang="nb-NO" sz="1600" dirty="0"/>
               <a:t>Defend the territory held or seized by the division’s menuevering units against enemy expected counter attacks</a:t>
             </a:r>
           </a:p>
@@ -12744,19 +13000,19 @@
               <a:buChar char="-"/>
             </a:pPr>
             <a:r>
-              <a:rPr lang="nb-NO" sz="1600" dirty="0" smtClean="0"/>
+              <a:rPr lang="nb-NO" sz="1600" dirty="0"/>
               <a:t>Optionally: Hold ground and provide cover for another division moving through seized area to continue the Corp’s offensive</a:t>
             </a:r>
           </a:p>
           <a:p>
-            <a:endParaRPr lang="nb-NO" sz="1600" dirty="0" smtClean="0"/>
-          </a:p>
-          <a:p>
-            <a:endParaRPr lang="nb-NO" sz="1600" dirty="0" smtClean="0"/>
-          </a:p>
-          <a:p>
-            <a:r>
-              <a:rPr lang="nb-NO" sz="1600" b="1" dirty="0" smtClean="0"/>
+            <a:endParaRPr lang="nb-NO" sz="1600" dirty="0"/>
+          </a:p>
+          <a:p>
+            <a:endParaRPr lang="nb-NO" sz="1600" dirty="0"/>
+          </a:p>
+          <a:p>
+            <a:r>
+              <a:rPr lang="nb-NO" sz="1600" b="1" dirty="0"/>
               <a:t>Activity:</a:t>
             </a:r>
           </a:p>
@@ -12766,16 +13022,16 @@
               <a:buChar char="-"/>
             </a:pPr>
             <a:r>
-              <a:rPr lang="nb-NO" sz="1600" dirty="0" smtClean="0"/>
+              <a:rPr lang="nb-NO" sz="1600" dirty="0"/>
               <a:t>Combat vehicles taking defensive positions. Most preferrably on high grounds, elevated positions or revetments to be used as static positions for observation and fire</a:t>
             </a:r>
           </a:p>
           <a:p>
-            <a:endParaRPr lang="nb-NO" sz="1600" dirty="0" smtClean="0"/>
-          </a:p>
-          <a:p>
-            <a:r>
-              <a:rPr lang="nb-NO" sz="1600" b="1" dirty="0" smtClean="0"/>
+            <a:endParaRPr lang="nb-NO" sz="1600" dirty="0"/>
+          </a:p>
+          <a:p>
+            <a:r>
+              <a:rPr lang="nb-NO" sz="1600" b="1" dirty="0"/>
               <a:t>Indicators:</a:t>
             </a:r>
           </a:p>
@@ -12785,7 +13041,7 @@
               <a:buChar char="-"/>
             </a:pPr>
             <a:r>
-              <a:rPr lang="nb-NO" sz="1600" dirty="0" smtClean="0"/>
+              <a:rPr lang="nb-NO" sz="1600" dirty="0"/>
               <a:t>Combat vehicles in static positions, usually on elevated grounds</a:t>
             </a:r>
           </a:p>
@@ -12795,7 +13051,7 @@
               <a:buChar char="-"/>
             </a:pPr>
             <a:r>
-              <a:rPr lang="nb-NO" sz="1600" dirty="0" smtClean="0"/>
+              <a:rPr lang="nb-NO" sz="1600" dirty="0"/>
               <a:t>Possible presence of logistics vehicles in/near defensive positions to resupply/service combat vehicles and personnel</a:t>
             </a:r>
           </a:p>
@@ -12804,21 +13060,21 @@
               <a:buFontTx/>
               <a:buChar char="-"/>
             </a:pPr>
-            <a:endParaRPr lang="nb-NO" sz="1600" dirty="0" smtClean="0"/>
+            <a:endParaRPr lang="nb-NO" sz="1600" dirty="0"/>
           </a:p>
           <a:p>
             <a:pPr marL="285750" indent="-285750">
               <a:buFontTx/>
               <a:buChar char="-"/>
             </a:pPr>
-            <a:endParaRPr lang="nb-NO" sz="1600" dirty="0" smtClean="0"/>
+            <a:endParaRPr lang="nb-NO" sz="1600" dirty="0"/>
           </a:p>
           <a:p>
             <a:pPr marL="285750" indent="-285750">
               <a:buFontTx/>
               <a:buChar char="-"/>
             </a:pPr>
-            <a:endParaRPr lang="nb-NO" sz="1600" dirty="0" smtClean="0"/>
+            <a:endParaRPr lang="nb-NO" sz="1600" dirty="0"/>
           </a:p>
         </p:txBody>
       </p:sp>
@@ -12827,13 +13083,6 @@
   <p:clrMapOvr>
     <a:masterClrMapping/>
   </p:clrMapOvr>
-  <p:timing>
-    <p:tnLst>
-      <p:par>
-        <p:cTn id="1" dur="indefinite" restart="never" nodeType="tmRoot"/>
-      </p:par>
-    </p:tnLst>
-  </p:timing>
 </p:sld>
 </file>
 
@@ -12875,10 +13124,9 @@
           <a:lstStyle/>
           <a:p>
             <a:r>
-              <a:rPr lang="en-US" sz="2000" dirty="0" smtClean="0"/>
+              <a:rPr lang="en-US" sz="2000" dirty="0"/>
               <a:t>USE OF SHOCK BATTALIONS / Special Operations forces</a:t>
             </a:r>
-            <a:endParaRPr lang="en-US" sz="2000" dirty="0"/>
           </a:p>
         </p:txBody>
       </p:sp>
@@ -12927,10 +13175,9 @@
           <a:p>
             <a:pPr algn="ctr"/>
             <a:r>
-              <a:rPr lang="nb-NO" sz="1200" dirty="0" smtClean="0"/>
+              <a:rPr lang="nb-NO" sz="1200" dirty="0"/>
               <a:t>A</a:t>
             </a:r>
-            <a:endParaRPr lang="nb-NO" sz="1200" dirty="0"/>
           </a:p>
         </p:txBody>
       </p:sp>
@@ -12979,10 +13226,9 @@
           <a:p>
             <a:pPr algn="ctr"/>
             <a:r>
-              <a:rPr lang="nb-NO" sz="1200" dirty="0" smtClean="0"/>
+              <a:rPr lang="nb-NO" sz="1200" dirty="0"/>
               <a:t>A</a:t>
             </a:r>
-            <a:endParaRPr lang="nb-NO" sz="1200" dirty="0"/>
           </a:p>
         </p:txBody>
       </p:sp>
@@ -13031,10 +13277,9 @@
           <a:p>
             <a:pPr algn="ctr"/>
             <a:r>
-              <a:rPr lang="nb-NO" sz="1200" dirty="0" smtClean="0"/>
+              <a:rPr lang="nb-NO" sz="1200" dirty="0"/>
               <a:t>B</a:t>
             </a:r>
-            <a:endParaRPr lang="nb-NO" sz="1200" dirty="0"/>
           </a:p>
         </p:txBody>
       </p:sp>
@@ -13083,10 +13328,9 @@
           <a:p>
             <a:pPr algn="ctr"/>
             <a:r>
-              <a:rPr lang="nb-NO" sz="1200" dirty="0" smtClean="0"/>
+              <a:rPr lang="nb-NO" sz="1200" dirty="0"/>
               <a:t>B</a:t>
             </a:r>
-            <a:endParaRPr lang="nb-NO" sz="1200" dirty="0"/>
           </a:p>
         </p:txBody>
       </p:sp>
@@ -13135,10 +13379,9 @@
           <a:p>
             <a:pPr algn="ctr"/>
             <a:r>
-              <a:rPr lang="nb-NO" sz="1200" dirty="0" smtClean="0"/>
+              <a:rPr lang="nb-NO" sz="1200" dirty="0"/>
               <a:t>C</a:t>
             </a:r>
-            <a:endParaRPr lang="nb-NO" sz="1200" dirty="0"/>
           </a:p>
         </p:txBody>
       </p:sp>
@@ -13187,10 +13430,9 @@
           <a:p>
             <a:pPr algn="ctr"/>
             <a:r>
-              <a:rPr lang="nb-NO" sz="1200" dirty="0" smtClean="0"/>
+              <a:rPr lang="nb-NO" sz="1200" dirty="0"/>
               <a:t>C</a:t>
             </a:r>
-            <a:endParaRPr lang="nb-NO" sz="1200" dirty="0"/>
           </a:p>
         </p:txBody>
       </p:sp>
@@ -13239,10 +13481,9 @@
           <a:p>
             <a:pPr algn="ctr"/>
             <a:r>
-              <a:rPr lang="nb-NO" sz="1200" dirty="0" smtClean="0"/>
+              <a:rPr lang="nb-NO" sz="1200" dirty="0"/>
               <a:t>D</a:t>
             </a:r>
-            <a:endParaRPr lang="nb-NO" sz="1200" dirty="0"/>
           </a:p>
         </p:txBody>
       </p:sp>
@@ -13291,10 +13532,9 @@
           <a:p>
             <a:pPr algn="ctr"/>
             <a:r>
-              <a:rPr lang="nb-NO" sz="1200" dirty="0" smtClean="0"/>
+              <a:rPr lang="nb-NO" sz="1200" dirty="0"/>
               <a:t>D</a:t>
             </a:r>
-            <a:endParaRPr lang="nb-NO" sz="1200" dirty="0"/>
           </a:p>
         </p:txBody>
       </p:sp>
@@ -13343,10 +13583,9 @@
           <a:p>
             <a:pPr algn="ctr"/>
             <a:r>
-              <a:rPr lang="nb-NO" sz="1200" dirty="0" smtClean="0"/>
+              <a:rPr lang="nb-NO" sz="1200" dirty="0"/>
               <a:t>E</a:t>
             </a:r>
-            <a:endParaRPr lang="nb-NO" sz="1200" dirty="0"/>
           </a:p>
         </p:txBody>
       </p:sp>
@@ -13395,10 +13634,9 @@
           <a:p>
             <a:pPr algn="ctr"/>
             <a:r>
-              <a:rPr lang="nb-NO" sz="1200" dirty="0" smtClean="0"/>
+              <a:rPr lang="nb-NO" sz="1200" dirty="0"/>
               <a:t>E</a:t>
             </a:r>
-            <a:endParaRPr lang="nb-NO" sz="1200" dirty="0"/>
           </a:p>
         </p:txBody>
       </p:sp>
@@ -13447,10 +13685,9 @@
           <a:p>
             <a:pPr algn="ctr"/>
             <a:r>
-              <a:rPr lang="nb-NO" sz="1200" dirty="0" smtClean="0"/>
+              <a:rPr lang="nb-NO" sz="1200" dirty="0"/>
               <a:t>F</a:t>
             </a:r>
-            <a:endParaRPr lang="nb-NO" sz="1200" dirty="0"/>
           </a:p>
         </p:txBody>
       </p:sp>
@@ -13499,10 +13736,9 @@
           <a:p>
             <a:pPr algn="ctr"/>
             <a:r>
-              <a:rPr lang="nb-NO" sz="1200" dirty="0" smtClean="0"/>
+              <a:rPr lang="nb-NO" sz="1200" dirty="0"/>
               <a:t>F</a:t>
             </a:r>
-            <a:endParaRPr lang="nb-NO" sz="1200" dirty="0"/>
           </a:p>
         </p:txBody>
       </p:sp>
@@ -13529,7 +13765,7 @@
           <a:lstStyle/>
           <a:p>
             <a:r>
-              <a:rPr lang="nb-NO" sz="1600" b="1" dirty="0" smtClean="0"/>
+              <a:rPr lang="nb-NO" sz="1600" b="1" dirty="0"/>
               <a:t>Purpose:</a:t>
             </a:r>
           </a:p>
@@ -13539,16 +13775,16 @@
               <a:buChar char="-"/>
             </a:pPr>
             <a:r>
-              <a:rPr lang="nb-NO" sz="1600" dirty="0" smtClean="0"/>
+              <a:rPr lang="nb-NO" sz="1600" dirty="0"/>
               <a:t>Use of small forces to shape conditions for the main offensive effort</a:t>
             </a:r>
           </a:p>
           <a:p>
-            <a:endParaRPr lang="nb-NO" sz="1600" dirty="0" smtClean="0"/>
-          </a:p>
-          <a:p>
-            <a:r>
-              <a:rPr lang="nb-NO" sz="1600" b="1" dirty="0" smtClean="0"/>
+            <a:endParaRPr lang="nb-NO" sz="1600" dirty="0"/>
+          </a:p>
+          <a:p>
+            <a:r>
+              <a:rPr lang="nb-NO" sz="1600" b="1" dirty="0"/>
               <a:t>Activity:</a:t>
             </a:r>
           </a:p>
@@ -13558,7 +13794,7 @@
               <a:buChar char="-"/>
             </a:pPr>
             <a:r>
-              <a:rPr lang="nb-NO" sz="1600" dirty="0" smtClean="0"/>
+              <a:rPr lang="nb-NO" sz="1600" dirty="0"/>
               <a:t>Move ahead of main Divisional forces for intelligence gathering, scouting and assesing enemy strength and deployments (finding week areas etc)</a:t>
             </a:r>
           </a:p>
@@ -13568,7 +13804,7 @@
               <a:buChar char="-"/>
             </a:pPr>
             <a:r>
-              <a:rPr lang="nb-NO" sz="1600" dirty="0" smtClean="0"/>
+              <a:rPr lang="nb-NO" sz="1600" dirty="0"/>
               <a:t>Infiltrate into enemy-held areas for specific operations such as:</a:t>
             </a:r>
           </a:p>
@@ -13578,7 +13814,7 @@
               <a:buChar char="-"/>
             </a:pPr>
             <a:r>
-              <a:rPr lang="nb-NO" sz="1600" dirty="0" smtClean="0"/>
+              <a:rPr lang="nb-NO" sz="1600" dirty="0"/>
               <a:t>Destroy bridges/ mine roads / place IEDs / set ambush points -  to disrupt enemy movements (reinforcements and maneuvers)</a:t>
             </a:r>
           </a:p>
@@ -13588,16 +13824,16 @@
               <a:buChar char="-"/>
             </a:pPr>
             <a:r>
-              <a:rPr lang="nb-NO" sz="1600" dirty="0" smtClean="0"/>
+              <a:rPr lang="nb-NO" sz="1600" dirty="0"/>
               <a:t>Attack command posts and communication sites to disrupt enemy Command&amp;Control capabilities</a:t>
             </a:r>
           </a:p>
           <a:p>
-            <a:endParaRPr lang="nb-NO" sz="1600" dirty="0" smtClean="0"/>
-          </a:p>
-          <a:p>
-            <a:r>
-              <a:rPr lang="nb-NO" sz="1600" b="1" dirty="0" smtClean="0"/>
+            <a:endParaRPr lang="nb-NO" sz="1600" dirty="0"/>
+          </a:p>
+          <a:p>
+            <a:r>
+              <a:rPr lang="nb-NO" sz="1600" b="1" dirty="0"/>
               <a:t>Indicators:</a:t>
             </a:r>
           </a:p>
@@ -13607,7 +13843,7 @@
               <a:buChar char="-"/>
             </a:pPr>
             <a:r>
-              <a:rPr lang="nb-NO" sz="1600" dirty="0" smtClean="0"/>
+              <a:rPr lang="nb-NO" sz="1600" dirty="0"/>
               <a:t>Signs of attacks / hostile activities inside friendly soil, up to several miles from the FLOT that are NOT part of a major offensive</a:t>
             </a:r>
           </a:p>
@@ -13617,34 +13853,34 @@
               <a:buChar char="-"/>
             </a:pPr>
             <a:r>
-              <a:rPr lang="nb-NO" sz="1600" dirty="0" smtClean="0"/>
+              <a:rPr lang="nb-NO" sz="1600" dirty="0"/>
               <a:t>Loss of contact with outposts or units </a:t>
             </a:r>
           </a:p>
           <a:p>
             <a:pPr lvl="1"/>
-            <a:endParaRPr lang="nb-NO" sz="1600" dirty="0" smtClean="0"/>
+            <a:endParaRPr lang="nb-NO" sz="1600" dirty="0"/>
           </a:p>
           <a:p>
             <a:pPr marL="285750" indent="-285750">
               <a:buFontTx/>
               <a:buChar char="-"/>
             </a:pPr>
-            <a:endParaRPr lang="nb-NO" sz="1600" dirty="0" smtClean="0"/>
+            <a:endParaRPr lang="nb-NO" sz="1600" dirty="0"/>
           </a:p>
           <a:p>
             <a:pPr marL="285750" indent="-285750">
               <a:buFontTx/>
               <a:buChar char="-"/>
             </a:pPr>
-            <a:endParaRPr lang="nb-NO" sz="1600" dirty="0" smtClean="0"/>
+            <a:endParaRPr lang="nb-NO" sz="1600" dirty="0"/>
           </a:p>
           <a:p>
             <a:pPr marL="285750" indent="-285750">
               <a:buFontTx/>
               <a:buChar char="-"/>
             </a:pPr>
-            <a:endParaRPr lang="nb-NO" sz="1600" dirty="0" smtClean="0"/>
+            <a:endParaRPr lang="nb-NO" sz="1600" dirty="0"/>
           </a:p>
         </p:txBody>
       </p:sp>
@@ -13654,13 +13890,6 @@
     <a:masterClrMapping/>
   </p:clrMapOvr>
   <p:transition/>
-  <p:timing>
-    <p:tnLst>
-      <p:par>
-        <p:cTn id="1" dur="indefinite" restart="never" nodeType="tmRoot"/>
-      </p:par>
-    </p:tnLst>
-  </p:timing>
 </p:sld>
 </file>
 

</xml_diff>